<commit_message>
9.6 manu and panalty change
</commit_message>
<xml_diff>
--- a/manu & slides/Final.pptx
+++ b/manu & slides/Final.pptx
@@ -647,7 +647,7 @@
             <a:fld id="{2A382978-60B3-41E0-9AD0-2E9E6E8B7873}" type="datetimeFigureOut">
               <a:rPr kumimoji="1" lang="ja-JP" altLang="en-US" smtClean="0"/>
               <a:pPr/>
-              <a:t>2018/8/24</a:t>
+              <a:t>2018/9/5</a:t>
             </a:fld>
             <a:endParaRPr kumimoji="1" lang="ja-JP" altLang="en-US"/>
           </a:p>
@@ -1798,7 +1798,7 @@
             <a:fld id="{0BD03392-274E-4A19-9716-EA1CE8085D71}" type="datetime1">
               <a:rPr kumimoji="1" lang="ja-JP" altLang="en-US" smtClean="0"/>
               <a:pPr/>
-              <a:t>2018/8/24</a:t>
+              <a:t>2018/9/5</a:t>
             </a:fld>
             <a:endParaRPr kumimoji="1" lang="ja-JP" altLang="en-US" dirty="0"/>
           </a:p>
@@ -2119,7 +2119,7 @@
             <a:fld id="{D658E221-2E7A-48BA-8424-2A55A4736B68}" type="datetime1">
               <a:rPr kumimoji="1" lang="ja-JP" altLang="en-US" smtClean="0"/>
               <a:pPr/>
-              <a:t>2018/8/24</a:t>
+              <a:t>2018/9/5</a:t>
             </a:fld>
             <a:endParaRPr kumimoji="1" lang="ja-JP" altLang="en-US"/>
           </a:p>
@@ -2235,7 +2235,7 @@
             <a:fld id="{C245638F-14AB-400C-9AF1-5CEBE1B672A1}" type="datetime1">
               <a:rPr kumimoji="1" lang="ja-JP" altLang="en-US" smtClean="0"/>
               <a:pPr/>
-              <a:t>2018/8/24</a:t>
+              <a:t>2018/9/5</a:t>
             </a:fld>
             <a:endParaRPr kumimoji="1" lang="ja-JP" altLang="en-US"/>
           </a:p>
@@ -2823,7 +2823,7 @@
             <a:fld id="{02A88367-5BB3-4793-B263-C2830A0855E0}" type="datetime1">
               <a:rPr kumimoji="1" lang="ja-JP" altLang="en-US" smtClean="0"/>
               <a:pPr/>
-              <a:t>2018/8/24</a:t>
+              <a:t>2018/9/5</a:t>
             </a:fld>
             <a:endParaRPr kumimoji="1" lang="ja-JP" altLang="en-US" dirty="0"/>
           </a:p>
@@ -3869,7 +3869,7 @@
             <a:fld id="{961A4739-C8B6-4F30-A69C-01268F05198C}" type="datetime1">
               <a:rPr kumimoji="1" lang="ja-JP" altLang="en-US" smtClean="0"/>
               <a:pPr/>
-              <a:t>2018/8/24</a:t>
+              <a:t>2018/9/5</a:t>
             </a:fld>
             <a:endParaRPr kumimoji="1" lang="ja-JP" altLang="en-US" dirty="0"/>
           </a:p>
@@ -5117,7 +5117,7 @@
             <a:fld id="{A55444AB-87B1-4B99-A470-0F837A8A1880}" type="datetime1">
               <a:rPr kumimoji="1" lang="ja-JP" altLang="en-US" smtClean="0"/>
               <a:pPr/>
-              <a:t>2018/8/24</a:t>
+              <a:t>2018/9/5</a:t>
             </a:fld>
             <a:endParaRPr kumimoji="1" lang="ja-JP" altLang="en-US" dirty="0"/>
           </a:p>
@@ -5786,7 +5786,7 @@
             <a:fld id="{C2A19EB9-4440-4736-9A49-939819AB9C89}" type="datetime1">
               <a:rPr kumimoji="1" lang="ja-JP" altLang="en-US" smtClean="0"/>
               <a:pPr/>
-              <a:t>2018/8/24</a:t>
+              <a:t>2018/9/5</a:t>
             </a:fld>
             <a:endParaRPr kumimoji="1" lang="ja-JP" altLang="en-US" dirty="0"/>
           </a:p>
@@ -6117,7 +6117,7 @@
             <a:fld id="{207CE768-5AA7-4F09-BE2B-CECF21207030}" type="datetime1">
               <a:rPr kumimoji="1" lang="ja-JP" altLang="en-US" smtClean="0"/>
               <a:pPr/>
-              <a:t>2018/8/24</a:t>
+              <a:t>2018/9/5</a:t>
             </a:fld>
             <a:endParaRPr kumimoji="1" lang="ja-JP" altLang="en-US" dirty="0"/>
           </a:p>
@@ -6386,7 +6386,7 @@
             <a:fld id="{973F8ED2-2E1E-42CA-8611-E2CA1599FB5D}" type="datetime1">
               <a:rPr kumimoji="1" lang="ja-JP" altLang="en-US" smtClean="0"/>
               <a:pPr/>
-              <a:t>2018/8/24</a:t>
+              <a:t>2018/9/5</a:t>
             </a:fld>
             <a:endParaRPr kumimoji="1" lang="ja-JP" altLang="en-US" dirty="0"/>
           </a:p>
@@ -6863,7 +6863,7 @@
             <a:fld id="{A5182719-F20C-4B32-BD5B-859B9127D393}" type="datetime1">
               <a:rPr lang="ja-JP" altLang="en-US" smtClean="0"/>
               <a:pPr/>
-              <a:t>2018/8/24</a:t>
+              <a:t>2018/9/5</a:t>
             </a:fld>
             <a:endParaRPr lang="ja-JP" altLang="en-US" dirty="0"/>
           </a:p>
@@ -7576,7 +7576,7 @@
           <p:cNvPr id="2" name="Title 1">
             <a:extLst>
               <a:ext uri="{FF2B5EF4-FFF2-40B4-BE49-F238E27FC236}">
-                <a16:creationId xmlns:a16="http://schemas.microsoft.com/office/drawing/2014/main" id="{A54FC90F-4208-4C28-8D1C-CFB3255E46EC}"/>
+                <a16:creationId xmlns:a16="http://schemas.microsoft.com/office/drawing/2014/main" xmlns="" id="{A54FC90F-4208-4C28-8D1C-CFB3255E46EC}"/>
               </a:ext>
             </a:extLst>
           </p:cNvPr>
@@ -7606,7 +7606,7 @@
               <p:cNvPr id="3" name="Content Placeholder 2">
                 <a:extLst>
                   <a:ext uri="{FF2B5EF4-FFF2-40B4-BE49-F238E27FC236}">
-                    <a16:creationId xmlns:a16="http://schemas.microsoft.com/office/drawing/2014/main" id="{E26182C4-45FA-4DE4-94F0-3A3B2995828F}"/>
+                    <a16:creationId xmlns:a16="http://schemas.microsoft.com/office/drawing/2014/main" xmlns="" id="{E26182C4-45FA-4DE4-94F0-3A3B2995828F}"/>
                   </a:ext>
                 </a:extLst>
               </p:cNvPr>
@@ -7906,7 +7906,7 @@
           <p:cNvPr id="4" name="Footer Placeholder 3">
             <a:extLst>
               <a:ext uri="{FF2B5EF4-FFF2-40B4-BE49-F238E27FC236}">
-                <a16:creationId xmlns:a16="http://schemas.microsoft.com/office/drawing/2014/main" id="{6237D0EF-67BB-47A8-BC4A-DA10DDA72B68}"/>
+                <a16:creationId xmlns:a16="http://schemas.microsoft.com/office/drawing/2014/main" xmlns="" id="{6237D0EF-67BB-47A8-BC4A-DA10DDA72B68}"/>
               </a:ext>
             </a:extLst>
           </p:cNvPr>
@@ -7963,7 +7963,7 @@
           <p:cNvPr id="5" name="Slide Number Placeholder 4">
             <a:extLst>
               <a:ext uri="{FF2B5EF4-FFF2-40B4-BE49-F238E27FC236}">
-                <a16:creationId xmlns:a16="http://schemas.microsoft.com/office/drawing/2014/main" id="{A66B1CD2-3511-4F21-AE65-973FFF59CAEB}"/>
+                <a16:creationId xmlns:a16="http://schemas.microsoft.com/office/drawing/2014/main" xmlns="" id="{A66B1CD2-3511-4F21-AE65-973FFF59CAEB}"/>
               </a:ext>
             </a:extLst>
           </p:cNvPr>
@@ -8023,7 +8023,7 @@
           <p:cNvPr id="2" name="Title 1">
             <a:extLst>
               <a:ext uri="{FF2B5EF4-FFF2-40B4-BE49-F238E27FC236}">
-                <a16:creationId xmlns:a16="http://schemas.microsoft.com/office/drawing/2014/main" id="{C31AD35B-6AF8-4890-9FAB-1A64CF8DF256}"/>
+                <a16:creationId xmlns:a16="http://schemas.microsoft.com/office/drawing/2014/main" xmlns="" id="{C31AD35B-6AF8-4890-9FAB-1A64CF8DF256}"/>
               </a:ext>
             </a:extLst>
           </p:cNvPr>
@@ -8053,7 +8053,7 @@
               <p:cNvPr id="3" name="Content Placeholder 2">
                 <a:extLst>
                   <a:ext uri="{FF2B5EF4-FFF2-40B4-BE49-F238E27FC236}">
-                    <a16:creationId xmlns:a16="http://schemas.microsoft.com/office/drawing/2014/main" id="{18A396A4-D801-4F52-8484-81CF6161ABD4}"/>
+                    <a16:creationId xmlns:a16="http://schemas.microsoft.com/office/drawing/2014/main" xmlns="" id="{18A396A4-D801-4F52-8484-81CF6161ABD4}"/>
                   </a:ext>
                 </a:extLst>
               </p:cNvPr>
@@ -8222,7 +8222,7 @@
                         <m:endChr m:val="]"/>
                         <m:ctrlPr>
                           <a:rPr lang="en-US" b="0" i="1" smtClean="0">
-                            <a:latin typeface="Cambria Math" panose="02040503050406030204" pitchFamily="18" charset="0"/>
+                            <a:latin typeface="Cambria Math" charset="0"/>
                           </a:rPr>
                         </m:ctrlPr>
                       </m:dPr>
@@ -8231,7 +8231,7 @@
                           <m:sSubPr>
                             <m:ctrlPr>
                               <a:rPr lang="en-US" b="0" i="1" smtClean="0">
-                                <a:latin typeface="Cambria Math" panose="02040503050406030204" pitchFamily="18" charset="0"/>
+                                <a:latin typeface="Cambria Math" charset="0"/>
                               </a:rPr>
                             </m:ctrlPr>
                           </m:sSubPr>
@@ -8262,7 +8262,7 @@
                           <m:sSubPr>
                             <m:ctrlPr>
                               <a:rPr lang="en-US" b="0" i="1" smtClean="0">
-                                <a:latin typeface="Cambria Math" panose="02040503050406030204" pitchFamily="18" charset="0"/>
+                                <a:latin typeface="Cambria Math" charset="0"/>
                               </a:rPr>
                             </m:ctrlPr>
                           </m:sSubPr>
@@ -8293,7 +8293,7 @@
                           <m:sSubPr>
                             <m:ctrlPr>
                               <a:rPr lang="en-US" b="0" i="1" smtClean="0">
-                                <a:latin typeface="Cambria Math" panose="02040503050406030204" pitchFamily="18" charset="0"/>
+                                <a:latin typeface="Cambria Math" charset="0"/>
                               </a:rPr>
                             </m:ctrlPr>
                           </m:sSubPr>
@@ -8360,7 +8360,7 @@
                       <m:sSubPr>
                         <m:ctrlPr>
                           <a:rPr lang="en-US" b="0" i="1" smtClean="0">
-                            <a:latin typeface="Cambria Math" panose="02040503050406030204" pitchFamily="18" charset="0"/>
+                            <a:latin typeface="Cambria Math" charset="0"/>
                           </a:rPr>
                         </m:ctrlPr>
                       </m:sSubPr>
@@ -8391,7 +8391,7 @@
                       <m:sSubPr>
                         <m:ctrlPr>
                           <a:rPr lang="en-US" b="0" i="1" smtClean="0">
-                            <a:latin typeface="Cambria Math" panose="02040503050406030204" pitchFamily="18" charset="0"/>
+                            <a:latin typeface="Cambria Math" charset="0"/>
                           </a:rPr>
                         </m:ctrlPr>
                       </m:sSubPr>
@@ -8422,7 +8422,7 @@
                       <m:sSubPr>
                         <m:ctrlPr>
                           <a:rPr lang="en-US" b="0" i="1" smtClean="0">
-                            <a:latin typeface="Cambria Math" panose="02040503050406030204" pitchFamily="18" charset="0"/>
+                            <a:latin typeface="Cambria Math" charset="0"/>
                           </a:rPr>
                         </m:ctrlPr>
                       </m:sSubPr>
@@ -8493,7 +8493,7 @@
                         <m:endChr m:val="]"/>
                         <m:ctrlPr>
                           <a:rPr lang="en-US" b="0" i="1" smtClean="0">
-                            <a:latin typeface="Cambria Math" panose="02040503050406030204" pitchFamily="18" charset="0"/>
+                            <a:latin typeface="Cambria Math" charset="0"/>
                             <a:ea typeface="Cambria Math" panose="02040503050406030204" pitchFamily="18" charset="0"/>
                           </a:rPr>
                         </m:ctrlPr>
@@ -8517,7 +8517,7 @@
                           <m:sSubPr>
                             <m:ctrlPr>
                               <a:rPr lang="en-US" b="0" i="1" smtClean="0">
-                                <a:latin typeface="Cambria Math" panose="02040503050406030204" pitchFamily="18" charset="0"/>
+                                <a:latin typeface="Cambria Math" charset="0"/>
                                 <a:ea typeface="Cambria Math" panose="02040503050406030204" pitchFamily="18" charset="0"/>
                               </a:rPr>
                             </m:ctrlPr>
@@ -8566,7 +8566,7 @@
                           <m:sSubPr>
                             <m:ctrlPr>
                               <a:rPr lang="en-US" b="0" i="1" smtClean="0">
-                                <a:latin typeface="Cambria Math" panose="02040503050406030204" pitchFamily="18" charset="0"/>
+                                <a:latin typeface="Cambria Math" charset="0"/>
                                 <a:ea typeface="Cambria Math" panose="02040503050406030204" pitchFamily="18" charset="0"/>
                               </a:rPr>
                             </m:ctrlPr>
@@ -8615,7 +8615,7 @@
                           <m:sSubPr>
                             <m:ctrlPr>
                               <a:rPr lang="en-US" b="0" i="1" smtClean="0">
-                                <a:latin typeface="Cambria Math" panose="02040503050406030204" pitchFamily="18" charset="0"/>
+                                <a:latin typeface="Cambria Math" charset="0"/>
                                 <a:ea typeface="Cambria Math" panose="02040503050406030204" pitchFamily="18" charset="0"/>
                               </a:rPr>
                             </m:ctrlPr>
@@ -8668,7 +8668,7 @@
                       <m:sSubPr>
                         <m:ctrlPr>
                           <a:rPr lang="en-US" b="0" i="1" smtClean="0">
-                            <a:latin typeface="Cambria Math" panose="02040503050406030204" pitchFamily="18" charset="0"/>
+                            <a:latin typeface="Cambria Math" charset="0"/>
                           </a:rPr>
                         </m:ctrlPr>
                       </m:sSubPr>
@@ -8699,7 +8699,7 @@
                       <m:sSubPr>
                         <m:ctrlPr>
                           <a:rPr lang="en-US" b="0" i="1" smtClean="0">
-                            <a:latin typeface="Cambria Math" panose="02040503050406030204" pitchFamily="18" charset="0"/>
+                            <a:latin typeface="Cambria Math" charset="0"/>
                           </a:rPr>
                         </m:ctrlPr>
                       </m:sSubPr>
@@ -8730,7 +8730,7 @@
                       <m:sSubPr>
                         <m:ctrlPr>
                           <a:rPr lang="en-US" b="0" i="1" smtClean="0">
-                            <a:latin typeface="Cambria Math" panose="02040503050406030204" pitchFamily="18" charset="0"/>
+                            <a:latin typeface="Cambria Math" charset="0"/>
                           </a:rPr>
                         </m:ctrlPr>
                       </m:sSubPr>
@@ -8818,7 +8818,7 @@
           <p:cNvPr id="4" name="Footer Placeholder 3">
             <a:extLst>
               <a:ext uri="{FF2B5EF4-FFF2-40B4-BE49-F238E27FC236}">
-                <a16:creationId xmlns:a16="http://schemas.microsoft.com/office/drawing/2014/main" id="{6BAF83D6-7B6B-4140-8307-D915BAB8E895}"/>
+                <a16:creationId xmlns:a16="http://schemas.microsoft.com/office/drawing/2014/main" xmlns="" id="{6BAF83D6-7B6B-4140-8307-D915BAB8E895}"/>
               </a:ext>
             </a:extLst>
           </p:cNvPr>
@@ -8875,7 +8875,7 @@
           <p:cNvPr id="5" name="Slide Number Placeholder 4">
             <a:extLst>
               <a:ext uri="{FF2B5EF4-FFF2-40B4-BE49-F238E27FC236}">
-                <a16:creationId xmlns:a16="http://schemas.microsoft.com/office/drawing/2014/main" id="{F9367D40-27EF-43BE-8724-D9FF4C023720}"/>
+                <a16:creationId xmlns:a16="http://schemas.microsoft.com/office/drawing/2014/main" xmlns="" id="{F9367D40-27EF-43BE-8724-D9FF4C023720}"/>
               </a:ext>
             </a:extLst>
           </p:cNvPr>
@@ -9334,7 +9334,7 @@
           <p:cNvPr id="2" name="Title 1">
             <a:extLst>
               <a:ext uri="{FF2B5EF4-FFF2-40B4-BE49-F238E27FC236}">
-                <a16:creationId xmlns:a16="http://schemas.microsoft.com/office/drawing/2014/main" id="{2080BB50-9AAA-448A-8376-CB859DE4375C}"/>
+                <a16:creationId xmlns:a16="http://schemas.microsoft.com/office/drawing/2014/main" xmlns="" id="{2080BB50-9AAA-448A-8376-CB859DE4375C}"/>
               </a:ext>
             </a:extLst>
           </p:cNvPr>
@@ -9364,7 +9364,7 @@
               <p:cNvPr id="3" name="Content Placeholder 2">
                 <a:extLst>
                   <a:ext uri="{FF2B5EF4-FFF2-40B4-BE49-F238E27FC236}">
-                    <a16:creationId xmlns:a16="http://schemas.microsoft.com/office/drawing/2014/main" id="{A6EFEA33-EC69-412C-9A8E-6154468EB6EC}"/>
+                    <a16:creationId xmlns:a16="http://schemas.microsoft.com/office/drawing/2014/main" xmlns="" id="{A6EFEA33-EC69-412C-9A8E-6154468EB6EC}"/>
                   </a:ext>
                 </a:extLst>
               </p:cNvPr>
@@ -9392,7 +9392,7 @@
                       <m:sSubPr>
                         <m:ctrlPr>
                           <a:rPr lang="en-US" altLang="en-US" b="0" i="1" smtClean="0">
-                            <a:latin typeface="Cambria Math" panose="02040503050406030204" pitchFamily="18" charset="0"/>
+                            <a:latin typeface="Cambria Math" charset="0"/>
                           </a:rPr>
                         </m:ctrlPr>
                       </m:sSubPr>
@@ -9417,7 +9417,7 @@
                       <m:sSubPr>
                         <m:ctrlPr>
                           <a:rPr lang="en-US" altLang="en-US" b="0" i="1" smtClean="0">
-                            <a:latin typeface="Cambria Math" panose="02040503050406030204" pitchFamily="18" charset="0"/>
+                            <a:latin typeface="Cambria Math" charset="0"/>
                           </a:rPr>
                         </m:ctrlPr>
                       </m:sSubPr>
@@ -9465,7 +9465,7 @@
                       <m:sSubPr>
                         <m:ctrlPr>
                           <a:rPr lang="en-US" altLang="en-US" b="0" i="1" smtClean="0">
-                            <a:latin typeface="Cambria Math" panose="02040503050406030204" pitchFamily="18" charset="0"/>
+                            <a:latin typeface="Cambria Math" charset="0"/>
                           </a:rPr>
                         </m:ctrlPr>
                       </m:sSubPr>
@@ -9490,7 +9490,7 @@
                       <m:sSubPr>
                         <m:ctrlPr>
                           <a:rPr lang="en-US" altLang="en-US" b="0" i="1" smtClean="0">
-                            <a:latin typeface="Cambria Math" panose="02040503050406030204" pitchFamily="18" charset="0"/>
+                            <a:latin typeface="Cambria Math" charset="0"/>
                           </a:rPr>
                         </m:ctrlPr>
                       </m:sSubPr>
@@ -9526,7 +9526,7 @@
                       <m:sSubPr>
                         <m:ctrlPr>
                           <a:rPr lang="en-US" altLang="en-US" b="0" i="1" smtClean="0">
-                            <a:latin typeface="Cambria Math" panose="02040503050406030204" pitchFamily="18" charset="0"/>
+                            <a:latin typeface="Cambria Math" charset="0"/>
                           </a:rPr>
                         </m:ctrlPr>
                       </m:sSubPr>
@@ -9571,7 +9571,7 @@
                       <m:sSubPr>
                         <m:ctrlPr>
                           <a:rPr lang="en-US" altLang="en-US" b="0" i="1" smtClean="0">
-                            <a:latin typeface="Cambria Math" panose="02040503050406030204" pitchFamily="18" charset="0"/>
+                            <a:latin typeface="Cambria Math" charset="0"/>
                           </a:rPr>
                         </m:ctrlPr>
                       </m:sSubPr>
@@ -9612,7 +9612,7 @@
                       <m:sSubPr>
                         <m:ctrlPr>
                           <a:rPr lang="en-US" altLang="en-US" b="0" i="1" smtClean="0">
-                            <a:latin typeface="Cambria Math" panose="02040503050406030204" pitchFamily="18" charset="0"/>
+                            <a:latin typeface="Cambria Math" charset="0"/>
                           </a:rPr>
                         </m:ctrlPr>
                       </m:sSubPr>
@@ -9643,7 +9643,7 @@
                       <m:sSubPr>
                         <m:ctrlPr>
                           <a:rPr lang="en-US" altLang="en-US" b="0" i="1" smtClean="0">
-                            <a:latin typeface="Cambria Math" panose="02040503050406030204" pitchFamily="18" charset="0"/>
+                            <a:latin typeface="Cambria Math" charset="0"/>
                           </a:rPr>
                         </m:ctrlPr>
                       </m:sSubPr>
@@ -9691,7 +9691,7 @@
                         <m:sSubPr>
                           <m:ctrlPr>
                             <a:rPr lang="en-US" altLang="en-US" i="1">
-                              <a:latin typeface="Cambria Math" panose="02040503050406030204" pitchFamily="18" charset="0"/>
+                              <a:latin typeface="Cambria Math" charset="0"/>
                             </a:rPr>
                           </m:ctrlPr>
                         </m:sSubPr>
@@ -9735,7 +9735,7 @@
                         <m:sSubPr>
                           <m:ctrlPr>
                             <a:rPr lang="en-US" altLang="en-US" i="1">
-                              <a:latin typeface="Cambria Math" panose="02040503050406030204" pitchFamily="18" charset="0"/>
+                              <a:latin typeface="Cambria Math" charset="0"/>
                             </a:rPr>
                           </m:ctrlPr>
                         </m:sSubPr>
@@ -9839,7 +9839,7 @@
           <p:cNvPr id="4" name="Footer Placeholder 3">
             <a:extLst>
               <a:ext uri="{FF2B5EF4-FFF2-40B4-BE49-F238E27FC236}">
-                <a16:creationId xmlns:a16="http://schemas.microsoft.com/office/drawing/2014/main" id="{A744C794-D14A-4C4F-AB6B-F5754FDC8048}"/>
+                <a16:creationId xmlns:a16="http://schemas.microsoft.com/office/drawing/2014/main" xmlns="" id="{A744C794-D14A-4C4F-AB6B-F5754FDC8048}"/>
               </a:ext>
             </a:extLst>
           </p:cNvPr>
@@ -9896,7 +9896,7 @@
           <p:cNvPr id="5" name="Slide Number Placeholder 4">
             <a:extLst>
               <a:ext uri="{FF2B5EF4-FFF2-40B4-BE49-F238E27FC236}">
-                <a16:creationId xmlns:a16="http://schemas.microsoft.com/office/drawing/2014/main" id="{F010A83B-80DD-4148-B633-CC1EA64BBC2F}"/>
+                <a16:creationId xmlns:a16="http://schemas.microsoft.com/office/drawing/2014/main" xmlns="" id="{F010A83B-80DD-4148-B633-CC1EA64BBC2F}"/>
               </a:ext>
             </a:extLst>
           </p:cNvPr>
@@ -10576,7 +10576,7 @@
               <p:cNvPr id="7" name="Content Placeholder 6">
                 <a:extLst>
                   <a:ext uri="{FF2B5EF4-FFF2-40B4-BE49-F238E27FC236}">
-                    <a16:creationId xmlns:a16="http://schemas.microsoft.com/office/drawing/2014/main" id="{A73C6DC9-E908-45A8-A4DC-4D5A9005AC6F}"/>
+                    <a16:creationId xmlns:a16="http://schemas.microsoft.com/office/drawing/2014/main" xmlns="" id="{A73C6DC9-E908-45A8-A4DC-4D5A9005AC6F}"/>
                   </a:ext>
                 </a:extLst>
               </p:cNvPr>
@@ -10737,7 +10737,7 @@
           <p:cNvPr id="2" name="Title 1">
             <a:extLst>
               <a:ext uri="{FF2B5EF4-FFF2-40B4-BE49-F238E27FC236}">
-                <a16:creationId xmlns:a16="http://schemas.microsoft.com/office/drawing/2014/main" id="{79DCF703-20AF-4958-B33E-F343978ACF91}"/>
+                <a16:creationId xmlns:a16="http://schemas.microsoft.com/office/drawing/2014/main" xmlns="" id="{79DCF703-20AF-4958-B33E-F343978ACF91}"/>
               </a:ext>
             </a:extLst>
           </p:cNvPr>
@@ -10767,7 +10767,7 @@
               <p:cNvPr id="3" name="Content Placeholder 2">
                 <a:extLst>
                   <a:ext uri="{FF2B5EF4-FFF2-40B4-BE49-F238E27FC236}">
-                    <a16:creationId xmlns:a16="http://schemas.microsoft.com/office/drawing/2014/main" id="{6D0CE62C-8863-4F49-A0FA-B90C4A09BB2E}"/>
+                    <a16:creationId xmlns:a16="http://schemas.microsoft.com/office/drawing/2014/main" xmlns="" id="{6D0CE62C-8863-4F49-A0FA-B90C4A09BB2E}"/>
                   </a:ext>
                 </a:extLst>
               </p:cNvPr>
@@ -10805,7 +10805,7 @@
                         <m:limLowPr>
                           <m:ctrlPr>
                             <a:rPr lang="en-US" b="0" i="1" smtClean="0">
-                              <a:latin typeface="Cambria Math" panose="02040503050406030204" pitchFamily="18" charset="0"/>
+                              <a:latin typeface="Cambria Math" charset="0"/>
                             </a:rPr>
                           </m:ctrlPr>
                         </m:limLowPr>
@@ -10839,7 +10839,7 @@
                         <m:dPr>
                           <m:ctrlPr>
                             <a:rPr lang="en-US" b="0" i="1" smtClean="0">
-                              <a:latin typeface="Cambria Math" panose="02040503050406030204" pitchFamily="18" charset="0"/>
+                              <a:latin typeface="Cambria Math" charset="0"/>
                             </a:rPr>
                           </m:ctrlPr>
                         </m:dPr>
@@ -10960,7 +10960,7 @@
                         <m:dPr>
                           <m:ctrlPr>
                             <a:rPr lang="en-US" b="0" i="1" smtClean="0">
-                              <a:latin typeface="Cambria Math" panose="02040503050406030204" pitchFamily="18" charset="0"/>
+                              <a:latin typeface="Cambria Math" charset="0"/>
                             </a:rPr>
                           </m:ctrlPr>
                         </m:dPr>
@@ -11117,7 +11117,7 @@
                         <m:sSupPr>
                           <m:ctrlPr>
                             <a:rPr lang="en-US" b="0" i="1" smtClean="0">
-                              <a:latin typeface="Cambria Math" panose="02040503050406030204" pitchFamily="18" charset="0"/>
+                              <a:latin typeface="Cambria Math" charset="0"/>
                             </a:rPr>
                           </m:ctrlPr>
                         </m:sSupPr>
@@ -11169,7 +11169,7 @@
                         <m:dPr>
                           <m:ctrlPr>
                             <a:rPr lang="en-US" b="0" i="1" smtClean="0">
-                              <a:latin typeface="Cambria Math" panose="02040503050406030204" pitchFamily="18" charset="0"/>
+                              <a:latin typeface="Cambria Math" charset="0"/>
                             </a:rPr>
                           </m:ctrlPr>
                         </m:dPr>
@@ -11200,7 +11200,7 @@
                           <m:supHide m:val="on"/>
                           <m:ctrlPr>
                             <a:rPr lang="en-US" b="0" i="1" smtClean="0">
-                              <a:latin typeface="Cambria Math" panose="02040503050406030204" pitchFamily="18" charset="0"/>
+                              <a:latin typeface="Cambria Math" charset="0"/>
                             </a:rPr>
                           </m:ctrlPr>
                         </m:naryPr>
@@ -11218,7 +11218,7 @@
                             <m:sSubPr>
                               <m:ctrlPr>
                                 <a:rPr lang="en-US" b="0" i="1" smtClean="0">
-                                  <a:latin typeface="Cambria Math" panose="02040503050406030204" pitchFamily="18" charset="0"/>
+                                  <a:latin typeface="Cambria Math" charset="0"/>
                                 </a:rPr>
                               </m:ctrlPr>
                             </m:sSubPr>
@@ -11249,7 +11249,7 @@
                             <m:sSubPr>
                               <m:ctrlPr>
                                 <a:rPr lang="en-US" b="0" i="1" smtClean="0">
-                                  <a:latin typeface="Cambria Math" panose="02040503050406030204" pitchFamily="18" charset="0"/>
+                                  <a:latin typeface="Cambria Math" charset="0"/>
                                 </a:rPr>
                               </m:ctrlPr>
                             </m:sSubPr>
@@ -11296,7 +11296,7 @@
                           <m:supHide m:val="on"/>
                           <m:ctrlPr>
                             <a:rPr lang="en-US" b="0" i="1" smtClean="0">
-                              <a:latin typeface="Cambria Math" panose="02040503050406030204" pitchFamily="18" charset="0"/>
+                              <a:latin typeface="Cambria Math" charset="0"/>
                             </a:rPr>
                           </m:ctrlPr>
                         </m:naryPr>
@@ -11314,7 +11314,7 @@
                             <m:sSubPr>
                               <m:ctrlPr>
                                 <a:rPr lang="en-US" b="0" i="1" smtClean="0">
-                                  <a:latin typeface="Cambria Math" panose="02040503050406030204" pitchFamily="18" charset="0"/>
+                                  <a:latin typeface="Cambria Math" charset="0"/>
                                 </a:rPr>
                               </m:ctrlPr>
                             </m:sSubPr>
@@ -11340,7 +11340,7 @@
                               <m:degHide m:val="on"/>
                               <m:ctrlPr>
                                 <a:rPr lang="en-US" b="0" i="1" smtClean="0">
-                                  <a:latin typeface="Cambria Math" panose="02040503050406030204" pitchFamily="18" charset="0"/>
+                                  <a:latin typeface="Cambria Math" charset="0"/>
                                 </a:rPr>
                               </m:ctrlPr>
                             </m:radPr>
@@ -11350,7 +11350,7 @@
                                 <m:sSubSupPr>
                                   <m:ctrlPr>
                                     <a:rPr lang="en-US" b="0" i="1" smtClean="0">
-                                      <a:latin typeface="Cambria Math" panose="02040503050406030204" pitchFamily="18" charset="0"/>
+                                      <a:latin typeface="Cambria Math" charset="0"/>
                                     </a:rPr>
                                   </m:ctrlPr>
                                 </m:sSubSupPr>
@@ -11389,7 +11389,7 @@
                                 <m:sSubSupPr>
                                   <m:ctrlPr>
                                     <a:rPr lang="en-US" i="1">
-                                      <a:latin typeface="Cambria Math" panose="02040503050406030204" pitchFamily="18" charset="0"/>
+                                      <a:latin typeface="Cambria Math" charset="0"/>
                                     </a:rPr>
                                   </m:ctrlPr>
                                 </m:sSubSupPr>
@@ -11448,7 +11448,7 @@
                             <m:sSubSupPr>
                               <m:ctrlPr>
                                 <a:rPr lang="en-US" b="0" i="1" smtClean="0">
-                                  <a:latin typeface="Cambria Math" panose="02040503050406030204" pitchFamily="18" charset="0"/>
+                                  <a:latin typeface="Cambria Math" charset="0"/>
                                 </a:rPr>
                               </m:ctrlPr>
                             </m:sSubSupPr>
@@ -11493,7 +11493,7 @@
                             <m:sSubSupPr>
                               <m:ctrlPr>
                                 <a:rPr lang="en-US" b="0" i="1" smtClean="0">
-                                  <a:latin typeface="Cambria Math" panose="02040503050406030204" pitchFamily="18" charset="0"/>
+                                  <a:latin typeface="Cambria Math" charset="0"/>
                                 </a:rPr>
                               </m:ctrlPr>
                             </m:sSubSupPr>
@@ -11666,7 +11666,7 @@
           <p:cNvPr id="4" name="Footer Placeholder 3">
             <a:extLst>
               <a:ext uri="{FF2B5EF4-FFF2-40B4-BE49-F238E27FC236}">
-                <a16:creationId xmlns:a16="http://schemas.microsoft.com/office/drawing/2014/main" id="{1F18B1F0-4748-4068-BA94-68CBCC62C648}"/>
+                <a16:creationId xmlns:a16="http://schemas.microsoft.com/office/drawing/2014/main" xmlns="" id="{1F18B1F0-4748-4068-BA94-68CBCC62C648}"/>
               </a:ext>
             </a:extLst>
           </p:cNvPr>
@@ -11723,7 +11723,7 @@
           <p:cNvPr id="5" name="Slide Number Placeholder 4">
             <a:extLst>
               <a:ext uri="{FF2B5EF4-FFF2-40B4-BE49-F238E27FC236}">
-                <a16:creationId xmlns:a16="http://schemas.microsoft.com/office/drawing/2014/main" id="{A39BFACB-D0EE-4249-B1AE-5CD08E88DBBB}"/>
+                <a16:creationId xmlns:a16="http://schemas.microsoft.com/office/drawing/2014/main" xmlns="" id="{A39BFACB-D0EE-4249-B1AE-5CD08E88DBBB}"/>
               </a:ext>
             </a:extLst>
           </p:cNvPr>
@@ -11753,7 +11753,7 @@
           <p:cNvPr id="6" name="Rectangle 5">
             <a:extLst>
               <a:ext uri="{FF2B5EF4-FFF2-40B4-BE49-F238E27FC236}">
-                <a16:creationId xmlns:a16="http://schemas.microsoft.com/office/drawing/2014/main" id="{64764CCA-1F94-4643-8696-38015A8294CF}"/>
+                <a16:creationId xmlns:a16="http://schemas.microsoft.com/office/drawing/2014/main" xmlns="" id="{64764CCA-1F94-4643-8696-38015A8294CF}"/>
               </a:ext>
             </a:extLst>
           </p:cNvPr>
@@ -11800,7 +11800,7 @@
           <p:cNvPr id="7" name="TextBox 6">
             <a:extLst>
               <a:ext uri="{FF2B5EF4-FFF2-40B4-BE49-F238E27FC236}">
-                <a16:creationId xmlns:a16="http://schemas.microsoft.com/office/drawing/2014/main" id="{B87C4414-32CE-48EE-8D41-5F0667A0BED6}"/>
+                <a16:creationId xmlns:a16="http://schemas.microsoft.com/office/drawing/2014/main" xmlns="" id="{B87C4414-32CE-48EE-8D41-5F0667A0BED6}"/>
               </a:ext>
             </a:extLst>
           </p:cNvPr>
@@ -11839,7 +11839,7 @@
           <p:cNvPr id="8" name="Rectangle 7">
             <a:extLst>
               <a:ext uri="{FF2B5EF4-FFF2-40B4-BE49-F238E27FC236}">
-                <a16:creationId xmlns:a16="http://schemas.microsoft.com/office/drawing/2014/main" id="{ED49BEB3-AB94-4944-AED1-ADBCB8B185F1}"/>
+                <a16:creationId xmlns:a16="http://schemas.microsoft.com/office/drawing/2014/main" xmlns="" id="{ED49BEB3-AB94-4944-AED1-ADBCB8B185F1}"/>
               </a:ext>
             </a:extLst>
           </p:cNvPr>
@@ -11886,7 +11886,7 @@
           <p:cNvPr id="9" name="TextBox 8">
             <a:extLst>
               <a:ext uri="{FF2B5EF4-FFF2-40B4-BE49-F238E27FC236}">
-                <a16:creationId xmlns:a16="http://schemas.microsoft.com/office/drawing/2014/main" id="{CD8EA2C0-923D-4F8F-938B-3185B131DE55}"/>
+                <a16:creationId xmlns:a16="http://schemas.microsoft.com/office/drawing/2014/main" xmlns="" id="{CD8EA2C0-923D-4F8F-938B-3185B131DE55}"/>
               </a:ext>
             </a:extLst>
           </p:cNvPr>
@@ -11925,7 +11925,7 @@
           <p:cNvPr id="10" name="Oval 9">
             <a:extLst>
               <a:ext uri="{FF2B5EF4-FFF2-40B4-BE49-F238E27FC236}">
-                <a16:creationId xmlns:a16="http://schemas.microsoft.com/office/drawing/2014/main" id="{79691CDE-3F86-4256-8C1E-9B075E05089F}"/>
+                <a16:creationId xmlns:a16="http://schemas.microsoft.com/office/drawing/2014/main" xmlns="" id="{79691CDE-3F86-4256-8C1E-9B075E05089F}"/>
               </a:ext>
             </a:extLst>
           </p:cNvPr>
@@ -11977,7 +11977,7 @@
           <p:cNvPr id="11" name="Oval 10">
             <a:extLst>
               <a:ext uri="{FF2B5EF4-FFF2-40B4-BE49-F238E27FC236}">
-                <a16:creationId xmlns:a16="http://schemas.microsoft.com/office/drawing/2014/main" id="{0EF577D3-557B-474C-B2B7-1F7AD8DDB4ED}"/>
+                <a16:creationId xmlns:a16="http://schemas.microsoft.com/office/drawing/2014/main" xmlns="" id="{0EF577D3-557B-474C-B2B7-1F7AD8DDB4ED}"/>
               </a:ext>
             </a:extLst>
           </p:cNvPr>
@@ -12029,7 +12029,7 @@
           <p:cNvPr id="12" name="TextBox 11">
             <a:extLst>
               <a:ext uri="{FF2B5EF4-FFF2-40B4-BE49-F238E27FC236}">
-                <a16:creationId xmlns:a16="http://schemas.microsoft.com/office/drawing/2014/main" id="{0F6488F4-3E4A-49E2-AA86-11BBFB3A70E6}"/>
+                <a16:creationId xmlns:a16="http://schemas.microsoft.com/office/drawing/2014/main" xmlns="" id="{0F6488F4-3E4A-49E2-AA86-11BBFB3A70E6}"/>
               </a:ext>
             </a:extLst>
           </p:cNvPr>
@@ -12574,7 +12574,7 @@
               <p:cNvPr id="3" name="TextBox 2">
                 <a:extLst>
                   <a:ext uri="{FF2B5EF4-FFF2-40B4-BE49-F238E27FC236}">
-                    <a16:creationId xmlns:a16="http://schemas.microsoft.com/office/drawing/2014/main" id="{DE36BEBA-512D-4F13-B097-9DA29F92D8A9}"/>
+                    <a16:creationId xmlns:a16="http://schemas.microsoft.com/office/drawing/2014/main" xmlns="" id="{DE36BEBA-512D-4F13-B097-9DA29F92D8A9}"/>
                   </a:ext>
                 </a:extLst>
               </p:cNvPr>
@@ -12688,7 +12688,7 @@
               <p:cNvPr id="10" name="TextBox 9">
                 <a:extLst>
                   <a:ext uri="{FF2B5EF4-FFF2-40B4-BE49-F238E27FC236}">
-                    <a16:creationId xmlns:a16="http://schemas.microsoft.com/office/drawing/2014/main" id="{DFB19A37-2B27-45C8-8757-A9EC693C1904}"/>
+                    <a16:creationId xmlns:a16="http://schemas.microsoft.com/office/drawing/2014/main" xmlns="" id="{DFB19A37-2B27-45C8-8757-A9EC693C1904}"/>
                   </a:ext>
                 </a:extLst>
               </p:cNvPr>
@@ -12800,7 +12800,7 @@
           <p:cNvPr id="7" name="Rectangle 6">
             <a:extLst>
               <a:ext uri="{FF2B5EF4-FFF2-40B4-BE49-F238E27FC236}">
-                <a16:creationId xmlns:a16="http://schemas.microsoft.com/office/drawing/2014/main" id="{C746CEDB-46C0-4343-B966-C84D0DAC3A34}"/>
+                <a16:creationId xmlns:a16="http://schemas.microsoft.com/office/drawing/2014/main" xmlns="" id="{C746CEDB-46C0-4343-B966-C84D0DAC3A34}"/>
               </a:ext>
             </a:extLst>
           </p:cNvPr>
@@ -12852,7 +12852,7 @@
           <p:cNvPr id="13" name="Rectangle 12">
             <a:extLst>
               <a:ext uri="{FF2B5EF4-FFF2-40B4-BE49-F238E27FC236}">
-                <a16:creationId xmlns:a16="http://schemas.microsoft.com/office/drawing/2014/main" id="{CF1FE3B8-89C0-4BC5-82A7-61C9CDE61A4F}"/>
+                <a16:creationId xmlns:a16="http://schemas.microsoft.com/office/drawing/2014/main" xmlns="" id="{CF1FE3B8-89C0-4BC5-82A7-61C9CDE61A4F}"/>
               </a:ext>
             </a:extLst>
           </p:cNvPr>
@@ -12904,7 +12904,7 @@
           <p:cNvPr id="14" name="Rectangle 13">
             <a:extLst>
               <a:ext uri="{FF2B5EF4-FFF2-40B4-BE49-F238E27FC236}">
-                <a16:creationId xmlns:a16="http://schemas.microsoft.com/office/drawing/2014/main" id="{EDF1C893-C24B-4453-8DD1-C2DD493E5AEE}"/>
+                <a16:creationId xmlns:a16="http://schemas.microsoft.com/office/drawing/2014/main" xmlns="" id="{EDF1C893-C24B-4453-8DD1-C2DD493E5AEE}"/>
               </a:ext>
             </a:extLst>
           </p:cNvPr>
@@ -12956,7 +12956,7 @@
           <p:cNvPr id="15" name="Rectangle 14">
             <a:extLst>
               <a:ext uri="{FF2B5EF4-FFF2-40B4-BE49-F238E27FC236}">
-                <a16:creationId xmlns:a16="http://schemas.microsoft.com/office/drawing/2014/main" id="{C36ACDF6-35EB-4B10-AD5E-4EFA08337D88}"/>
+                <a16:creationId xmlns:a16="http://schemas.microsoft.com/office/drawing/2014/main" xmlns="" id="{C36ACDF6-35EB-4B10-AD5E-4EFA08337D88}"/>
               </a:ext>
             </a:extLst>
           </p:cNvPr>
@@ -13010,7 +13010,7 @@
               <p:cNvPr id="8" name="TextBox 7">
                 <a:extLst>
                   <a:ext uri="{FF2B5EF4-FFF2-40B4-BE49-F238E27FC236}">
-                    <a16:creationId xmlns:a16="http://schemas.microsoft.com/office/drawing/2014/main" id="{DABA1900-B631-45EA-A1CC-AA027209DF26}"/>
+                    <a16:creationId xmlns:a16="http://schemas.microsoft.com/office/drawing/2014/main" xmlns="" id="{DABA1900-B631-45EA-A1CC-AA027209DF26}"/>
                   </a:ext>
                 </a:extLst>
               </p:cNvPr>
@@ -13050,7 +13050,7 @@
                         <m:dPr>
                           <m:ctrlPr>
                             <a:rPr lang="en-US" b="0" i="1" smtClean="0">
-                              <a:latin typeface="Cambria Math" panose="02040503050406030204" pitchFamily="18" charset="0"/>
+                              <a:latin typeface="Cambria Math" charset="0"/>
                             </a:rPr>
                           </m:ctrlPr>
                         </m:dPr>
@@ -13087,7 +13087,7 @@
                           <m:endChr m:val="|"/>
                           <m:ctrlPr>
                             <a:rPr lang="en-US" b="0" i="1" smtClean="0">
-                              <a:latin typeface="Cambria Math" panose="02040503050406030204" pitchFamily="18" charset="0"/>
+                              <a:latin typeface="Cambria Math" charset="0"/>
                             </a:rPr>
                           </m:ctrlPr>
                         </m:dPr>
@@ -13111,7 +13111,7 @@
                           <m:degHide m:val="on"/>
                           <m:ctrlPr>
                             <a:rPr lang="en-US" b="0" i="1" smtClean="0">
-                              <a:latin typeface="Cambria Math" panose="02040503050406030204" pitchFamily="18" charset="0"/>
+                              <a:latin typeface="Cambria Math" charset="0"/>
                             </a:rPr>
                           </m:ctrlPr>
                         </m:radPr>
@@ -13121,7 +13121,7 @@
                             <m:sSupPr>
                               <m:ctrlPr>
                                 <a:rPr lang="en-US" b="0" i="1" smtClean="0">
-                                  <a:latin typeface="Cambria Math" panose="02040503050406030204" pitchFamily="18" charset="0"/>
+                                  <a:latin typeface="Cambria Math" charset="0"/>
                                 </a:rPr>
                               </m:ctrlPr>
                             </m:sSupPr>
@@ -13152,7 +13152,7 @@
                             <m:sSupPr>
                               <m:ctrlPr>
                                 <a:rPr lang="en-US" i="1">
-                                  <a:latin typeface="Cambria Math" panose="02040503050406030204" pitchFamily="18" charset="0"/>
+                                  <a:latin typeface="Cambria Math" charset="0"/>
                                 </a:rPr>
                               </m:ctrlPr>
                             </m:sSupPr>
@@ -13233,7 +13233,7 @@
           <p:cNvPr id="19" name="Straight Arrow Connector 18">
             <a:extLst>
               <a:ext uri="{FF2B5EF4-FFF2-40B4-BE49-F238E27FC236}">
-                <a16:creationId xmlns:a16="http://schemas.microsoft.com/office/drawing/2014/main" id="{9B77BD76-ECB9-462D-8AD6-F96FC3911B42}"/>
+                <a16:creationId xmlns:a16="http://schemas.microsoft.com/office/drawing/2014/main" xmlns="" id="{9B77BD76-ECB9-462D-8AD6-F96FC3911B42}"/>
               </a:ext>
             </a:extLst>
           </p:cNvPr>
@@ -13276,7 +13276,7 @@
               <p:cNvPr id="21" name="TextBox 20">
                 <a:extLst>
                   <a:ext uri="{FF2B5EF4-FFF2-40B4-BE49-F238E27FC236}">
-                    <a16:creationId xmlns:a16="http://schemas.microsoft.com/office/drawing/2014/main" id="{D24DA0BD-548E-46C2-88A1-78C9EA0133DD}"/>
+                    <a16:creationId xmlns:a16="http://schemas.microsoft.com/office/drawing/2014/main" xmlns="" id="{D24DA0BD-548E-46C2-88A1-78C9EA0133DD}"/>
                   </a:ext>
                 </a:extLst>
               </p:cNvPr>
@@ -13398,7 +13398,7 @@
           <p:cNvPr id="25" name="Straight Arrow Connector 24">
             <a:extLst>
               <a:ext uri="{FF2B5EF4-FFF2-40B4-BE49-F238E27FC236}">
-                <a16:creationId xmlns:a16="http://schemas.microsoft.com/office/drawing/2014/main" id="{C949D0D1-57EE-4585-9DDE-C033C067204F}"/>
+                <a16:creationId xmlns:a16="http://schemas.microsoft.com/office/drawing/2014/main" xmlns="" id="{C949D0D1-57EE-4585-9DDE-C033C067204F}"/>
               </a:ext>
             </a:extLst>
           </p:cNvPr>
@@ -13439,7 +13439,7 @@
           <p:cNvPr id="27" name="Straight Arrow Connector 26">
             <a:extLst>
               <a:ext uri="{FF2B5EF4-FFF2-40B4-BE49-F238E27FC236}">
-                <a16:creationId xmlns:a16="http://schemas.microsoft.com/office/drawing/2014/main" id="{8C4DE4FC-0E6A-4AE5-A1FB-9160A70BA9EE}"/>
+                <a16:creationId xmlns:a16="http://schemas.microsoft.com/office/drawing/2014/main" xmlns="" id="{8C4DE4FC-0E6A-4AE5-A1FB-9160A70BA9EE}"/>
               </a:ext>
             </a:extLst>
           </p:cNvPr>
@@ -13508,7 +13508,7 @@
                         <m:limLowPr>
                           <m:ctrlPr>
                             <a:rPr lang="en-US" b="0" i="1" smtClean="0">
-                              <a:latin typeface="Cambria Math" panose="02040503050406030204" pitchFamily="18" charset="0"/>
+                              <a:latin typeface="Cambria Math" charset="0"/>
                             </a:rPr>
                           </m:ctrlPr>
                         </m:limLowPr>
@@ -13569,7 +13569,7 @@
                         <m:dPr>
                           <m:ctrlPr>
                             <a:rPr lang="en-US" b="0" i="1" smtClean="0">
-                              <a:latin typeface="Cambria Math" panose="02040503050406030204" pitchFamily="18" charset="0"/>
+                              <a:latin typeface="Cambria Math" charset="0"/>
                             </a:rPr>
                           </m:ctrlPr>
                         </m:dPr>
@@ -13688,7 +13688,7 @@
           <p:cNvPr id="16" name="Oval 15">
             <a:extLst>
               <a:ext uri="{FF2B5EF4-FFF2-40B4-BE49-F238E27FC236}">
-                <a16:creationId xmlns:a16="http://schemas.microsoft.com/office/drawing/2014/main" id="{BDBDC304-BF8C-4571-A813-34E2E071939A}"/>
+                <a16:creationId xmlns:a16="http://schemas.microsoft.com/office/drawing/2014/main" xmlns="" id="{BDBDC304-BF8C-4571-A813-34E2E071939A}"/>
               </a:ext>
             </a:extLst>
           </p:cNvPr>
@@ -13735,7 +13735,7 @@
           <p:cNvPr id="22" name="Oval 21">
             <a:extLst>
               <a:ext uri="{FF2B5EF4-FFF2-40B4-BE49-F238E27FC236}">
-                <a16:creationId xmlns:a16="http://schemas.microsoft.com/office/drawing/2014/main" id="{6E81FA2F-AA60-474A-BEAF-6B3B5796E70F}"/>
+                <a16:creationId xmlns:a16="http://schemas.microsoft.com/office/drawing/2014/main" xmlns="" id="{6E81FA2F-AA60-474A-BEAF-6B3B5796E70F}"/>
               </a:ext>
             </a:extLst>
           </p:cNvPr>
@@ -13782,7 +13782,7 @@
           <p:cNvPr id="23" name="Oval 22">
             <a:extLst>
               <a:ext uri="{FF2B5EF4-FFF2-40B4-BE49-F238E27FC236}">
-                <a16:creationId xmlns:a16="http://schemas.microsoft.com/office/drawing/2014/main" id="{E2AF8601-042F-499B-B4B8-214F9EA13D93}"/>
+                <a16:creationId xmlns:a16="http://schemas.microsoft.com/office/drawing/2014/main" xmlns="" id="{E2AF8601-042F-499B-B4B8-214F9EA13D93}"/>
               </a:ext>
             </a:extLst>
           </p:cNvPr>
@@ -13829,7 +13829,7 @@
           <p:cNvPr id="24" name="Oval 23">
             <a:extLst>
               <a:ext uri="{FF2B5EF4-FFF2-40B4-BE49-F238E27FC236}">
-                <a16:creationId xmlns:a16="http://schemas.microsoft.com/office/drawing/2014/main" id="{1C803775-322A-488C-ADE6-BE3032CCB174}"/>
+                <a16:creationId xmlns:a16="http://schemas.microsoft.com/office/drawing/2014/main" xmlns="" id="{1C803775-322A-488C-ADE6-BE3032CCB174}"/>
               </a:ext>
             </a:extLst>
           </p:cNvPr>
@@ -13876,7 +13876,7 @@
           <p:cNvPr id="26" name="Oval 25">
             <a:extLst>
               <a:ext uri="{FF2B5EF4-FFF2-40B4-BE49-F238E27FC236}">
-                <a16:creationId xmlns:a16="http://schemas.microsoft.com/office/drawing/2014/main" id="{E4BA88DF-1D96-4CB5-91BE-D6D18F8D2318}"/>
+                <a16:creationId xmlns:a16="http://schemas.microsoft.com/office/drawing/2014/main" xmlns="" id="{E4BA88DF-1D96-4CB5-91BE-D6D18F8D2318}"/>
               </a:ext>
             </a:extLst>
           </p:cNvPr>
@@ -13923,7 +13923,7 @@
           <p:cNvPr id="28" name="Oval 27">
             <a:extLst>
               <a:ext uri="{FF2B5EF4-FFF2-40B4-BE49-F238E27FC236}">
-                <a16:creationId xmlns:a16="http://schemas.microsoft.com/office/drawing/2014/main" id="{DFE4836F-0E78-4CAF-881B-E997926D32B1}"/>
+                <a16:creationId xmlns:a16="http://schemas.microsoft.com/office/drawing/2014/main" xmlns="" id="{DFE4836F-0E78-4CAF-881B-E997926D32B1}"/>
               </a:ext>
             </a:extLst>
           </p:cNvPr>
@@ -13972,7 +13972,7 @@
               <p:cNvPr id="29" name="TextBox 28">
                 <a:extLst>
                   <a:ext uri="{FF2B5EF4-FFF2-40B4-BE49-F238E27FC236}">
-                    <a16:creationId xmlns:a16="http://schemas.microsoft.com/office/drawing/2014/main" id="{7D95C71D-EA70-4BD3-A5F2-ABFCDBD3CC1D}"/>
+                    <a16:creationId xmlns:a16="http://schemas.microsoft.com/office/drawing/2014/main" xmlns="" id="{7D95C71D-EA70-4BD3-A5F2-ABFCDBD3CC1D}"/>
                   </a:ext>
                 </a:extLst>
               </p:cNvPr>
@@ -14084,7 +14084,7 @@
           <p:cNvPr id="18" name="Picture 17" descr="A picture containing object&#10;&#10;Description generated with high confidence">
             <a:extLst>
               <a:ext uri="{FF2B5EF4-FFF2-40B4-BE49-F238E27FC236}">
-                <a16:creationId xmlns:a16="http://schemas.microsoft.com/office/drawing/2014/main" id="{51723A5D-1E6B-4201-85F5-CFB1BA73AA3B}"/>
+                <a16:creationId xmlns:a16="http://schemas.microsoft.com/office/drawing/2014/main" xmlns="" id="{51723A5D-1E6B-4201-85F5-CFB1BA73AA3B}"/>
               </a:ext>
             </a:extLst>
           </p:cNvPr>
@@ -14487,7 +14487,7 @@
           <p:cNvPr id="2" name="Title 1">
             <a:extLst>
               <a:ext uri="{FF2B5EF4-FFF2-40B4-BE49-F238E27FC236}">
-                <a16:creationId xmlns:a16="http://schemas.microsoft.com/office/drawing/2014/main" id="{2CFCB053-9302-4433-A0EE-928F053E8F9E}"/>
+                <a16:creationId xmlns:a16="http://schemas.microsoft.com/office/drawing/2014/main" xmlns="" id="{2CFCB053-9302-4433-A0EE-928F053E8F9E}"/>
               </a:ext>
             </a:extLst>
           </p:cNvPr>
@@ -14517,7 +14517,7 @@
               <p:cNvPr id="3" name="Content Placeholder 2">
                 <a:extLst>
                   <a:ext uri="{FF2B5EF4-FFF2-40B4-BE49-F238E27FC236}">
-                    <a16:creationId xmlns:a16="http://schemas.microsoft.com/office/drawing/2014/main" id="{91C89943-CCF2-4951-9FEA-DA883C21955D}"/>
+                    <a16:creationId xmlns:a16="http://schemas.microsoft.com/office/drawing/2014/main" xmlns="" id="{91C89943-CCF2-4951-9FEA-DA883C21955D}"/>
                   </a:ext>
                 </a:extLst>
               </p:cNvPr>
@@ -14548,7 +14548,7 @@
                         <m:limLowPr>
                           <m:ctrlPr>
                             <a:rPr lang="en-US" b="0" i="1" smtClean="0">
-                              <a:latin typeface="Cambria Math" panose="02040503050406030204" pitchFamily="18" charset="0"/>
+                              <a:latin typeface="Cambria Math" charset="0"/>
                             </a:rPr>
                           </m:ctrlPr>
                         </m:limLowPr>
@@ -14672,7 +14672,7 @@
                         <m:sSupPr>
                           <m:ctrlPr>
                             <a:rPr lang="en-US" i="1">
-                              <a:latin typeface="Cambria Math" panose="02040503050406030204" pitchFamily="18" charset="0"/>
+                              <a:latin typeface="Cambria Math" charset="0"/>
                             </a:rPr>
                           </m:ctrlPr>
                         </m:sSupPr>
@@ -14728,7 +14728,7 @@
                           <m:supHide m:val="on"/>
                           <m:ctrlPr>
                             <a:rPr lang="en-US" i="1">
-                              <a:latin typeface="Cambria Math" panose="02040503050406030204" pitchFamily="18" charset="0"/>
+                              <a:latin typeface="Cambria Math" charset="0"/>
                             </a:rPr>
                           </m:ctrlPr>
                         </m:naryPr>
@@ -14746,7 +14746,7 @@
                             <m:sSubPr>
                               <m:ctrlPr>
                                 <a:rPr lang="en-US" i="1">
-                                  <a:latin typeface="Cambria Math" panose="02040503050406030204" pitchFamily="18" charset="0"/>
+                                  <a:latin typeface="Cambria Math" charset="0"/>
                                 </a:rPr>
                               </m:ctrlPr>
                             </m:sSubPr>
@@ -14777,7 +14777,7 @@
                             <m:sSubPr>
                               <m:ctrlPr>
                                 <a:rPr lang="en-US" i="1">
-                                  <a:latin typeface="Cambria Math" panose="02040503050406030204" pitchFamily="18" charset="0"/>
+                                  <a:latin typeface="Cambria Math" charset="0"/>
                                 </a:rPr>
                               </m:ctrlPr>
                             </m:sSubPr>
@@ -14824,7 +14824,7 @@
                           <m:supHide m:val="on"/>
                           <m:ctrlPr>
                             <a:rPr lang="en-US" i="1">
-                              <a:latin typeface="Cambria Math" panose="02040503050406030204" pitchFamily="18" charset="0"/>
+                              <a:latin typeface="Cambria Math" charset="0"/>
                             </a:rPr>
                           </m:ctrlPr>
                         </m:naryPr>
@@ -14842,7 +14842,7 @@
                             <m:sSubPr>
                               <m:ctrlPr>
                                 <a:rPr lang="en-US" i="1">
-                                  <a:latin typeface="Cambria Math" panose="02040503050406030204" pitchFamily="18" charset="0"/>
+                                  <a:latin typeface="Cambria Math" charset="0"/>
                                 </a:rPr>
                               </m:ctrlPr>
                             </m:sSubPr>
@@ -14868,7 +14868,7 @@
                               <m:degHide m:val="on"/>
                               <m:ctrlPr>
                                 <a:rPr lang="en-US" i="1">
-                                  <a:latin typeface="Cambria Math" panose="02040503050406030204" pitchFamily="18" charset="0"/>
+                                  <a:latin typeface="Cambria Math" charset="0"/>
                                 </a:rPr>
                               </m:ctrlPr>
                             </m:radPr>
@@ -14878,7 +14878,7 @@
                                 <m:sSubSupPr>
                                   <m:ctrlPr>
                                     <a:rPr lang="en-US" i="1">
-                                      <a:latin typeface="Cambria Math" panose="02040503050406030204" pitchFamily="18" charset="0"/>
+                                      <a:latin typeface="Cambria Math" charset="0"/>
                                     </a:rPr>
                                   </m:ctrlPr>
                                 </m:sSubSupPr>
@@ -14917,7 +14917,7 @@
                                 <m:sSubSupPr>
                                   <m:ctrlPr>
                                     <a:rPr lang="en-US" i="1">
-                                      <a:latin typeface="Cambria Math" panose="02040503050406030204" pitchFamily="18" charset="0"/>
+                                      <a:latin typeface="Cambria Math" charset="0"/>
                                     </a:rPr>
                                   </m:ctrlPr>
                                 </m:sSubSupPr>
@@ -14978,7 +14978,7 @@
                         <m:sSubSupPr>
                           <m:ctrlPr>
                             <a:rPr lang="en-US" i="1">
-                              <a:latin typeface="Cambria Math" panose="02040503050406030204" pitchFamily="18" charset="0"/>
+                              <a:latin typeface="Cambria Math" charset="0"/>
                             </a:rPr>
                           </m:ctrlPr>
                         </m:sSubSupPr>
@@ -15023,7 +15023,7 @@
                         <m:sSubSupPr>
                           <m:ctrlPr>
                             <a:rPr lang="en-US" i="1">
-                              <a:latin typeface="Cambria Math" panose="02040503050406030204" pitchFamily="18" charset="0"/>
+                              <a:latin typeface="Cambria Math" charset="0"/>
                             </a:rPr>
                           </m:ctrlPr>
                         </m:sSubSupPr>
@@ -15206,7 +15206,7 @@
           <p:cNvPr id="4" name="Footer Placeholder 3">
             <a:extLst>
               <a:ext uri="{FF2B5EF4-FFF2-40B4-BE49-F238E27FC236}">
-                <a16:creationId xmlns:a16="http://schemas.microsoft.com/office/drawing/2014/main" id="{C3DE3A06-EBAA-4965-8CF9-209DC7F747F4}"/>
+                <a16:creationId xmlns:a16="http://schemas.microsoft.com/office/drawing/2014/main" xmlns="" id="{C3DE3A06-EBAA-4965-8CF9-209DC7F747F4}"/>
               </a:ext>
             </a:extLst>
           </p:cNvPr>
@@ -15263,7 +15263,7 @@
           <p:cNvPr id="5" name="Slide Number Placeholder 4">
             <a:extLst>
               <a:ext uri="{FF2B5EF4-FFF2-40B4-BE49-F238E27FC236}">
-                <a16:creationId xmlns:a16="http://schemas.microsoft.com/office/drawing/2014/main" id="{79528500-A9D8-47D3-8FAC-D951DC78692E}"/>
+                <a16:creationId xmlns:a16="http://schemas.microsoft.com/office/drawing/2014/main" xmlns="" id="{79528500-A9D8-47D3-8FAC-D951DC78692E}"/>
               </a:ext>
             </a:extLst>
           </p:cNvPr>
@@ -15293,7 +15293,7 @@
           <p:cNvPr id="6" name="Rectangle 5">
             <a:extLst>
               <a:ext uri="{FF2B5EF4-FFF2-40B4-BE49-F238E27FC236}">
-                <a16:creationId xmlns:a16="http://schemas.microsoft.com/office/drawing/2014/main" id="{78E5842B-094D-4251-BF6D-9492E15A8993}"/>
+                <a16:creationId xmlns:a16="http://schemas.microsoft.com/office/drawing/2014/main" xmlns="" id="{78E5842B-094D-4251-BF6D-9492E15A8993}"/>
               </a:ext>
             </a:extLst>
           </p:cNvPr>
@@ -15918,7 +15918,7 @@
           <p:cNvPr id="3" name="TextBox 2">
             <a:extLst>
               <a:ext uri="{FF2B5EF4-FFF2-40B4-BE49-F238E27FC236}">
-                <a16:creationId xmlns:a16="http://schemas.microsoft.com/office/drawing/2014/main" id="{8D1DBAA3-DFB4-4B72-933E-70C9E117546A}"/>
+                <a16:creationId xmlns:a16="http://schemas.microsoft.com/office/drawing/2014/main" xmlns="" id="{8D1DBAA3-DFB4-4B72-933E-70C9E117546A}"/>
               </a:ext>
             </a:extLst>
           </p:cNvPr>
@@ -15953,7 +15953,7 @@
           <p:cNvPr id="6" name="Arrow: Right 5">
             <a:extLst>
               <a:ext uri="{FF2B5EF4-FFF2-40B4-BE49-F238E27FC236}">
-                <a16:creationId xmlns:a16="http://schemas.microsoft.com/office/drawing/2014/main" id="{94A07FE0-D906-4F8B-BA56-443C9FB13696}"/>
+                <a16:creationId xmlns:a16="http://schemas.microsoft.com/office/drawing/2014/main" xmlns="" id="{94A07FE0-D906-4F8B-BA56-443C9FB13696}"/>
               </a:ext>
             </a:extLst>
           </p:cNvPr>
@@ -15994,14 +15994,14 @@
           </a:p>
         </p:txBody>
       </p:sp>
-      <mc:AlternateContent xmlns:mc="http://schemas.openxmlformats.org/markup-compatibility/2006" xmlns:a14="http://schemas.microsoft.com/office/drawing/2010/main">
-        <mc:Choice Requires="a14">
+      <mc:AlternateContent xmlns:mc="http://schemas.openxmlformats.org/markup-compatibility/2006">
+        <mc:Choice xmlns:a14="http://schemas.microsoft.com/office/drawing/2010/main" Requires="a14">
           <p:sp>
             <p:nvSpPr>
               <p:cNvPr id="8" name="Content Placeholder 7">
                 <a:extLst>
                   <a:ext uri="{FF2B5EF4-FFF2-40B4-BE49-F238E27FC236}">
-                    <a16:creationId xmlns:a16="http://schemas.microsoft.com/office/drawing/2014/main" id="{0A6E8DC9-E40C-4CD5-9856-9CF482BA5FD5}"/>
+                    <a16:creationId xmlns:a16="http://schemas.microsoft.com/office/drawing/2014/main" xmlns="" id="{0A6E8DC9-E40C-4CD5-9856-9CF482BA5FD5}"/>
                   </a:ext>
                 </a:extLst>
               </p:cNvPr>
@@ -16020,7 +16020,7 @@
             </p:spPr>
             <p:txBody>
               <a:bodyPr>
-                <a:normAutofit fontScale="92500"/>
+                <a:normAutofit fontScale="92500" lnSpcReduction="10000"/>
               </a:bodyPr>
               <a:lstStyle/>
               <a:p>
@@ -16037,7 +16037,7 @@
                         <m:limLowPr>
                           <m:ctrlPr>
                             <a:rPr lang="en-US" i="1" smtClean="0">
-                              <a:latin typeface="Cambria Math" panose="02040503050406030204" pitchFamily="18" charset="0"/>
+                              <a:latin typeface="Cambria Math" charset="0"/>
                             </a:rPr>
                           </m:ctrlPr>
                         </m:limLowPr>
@@ -16161,7 +16161,7 @@
                         <m:sSupPr>
                           <m:ctrlPr>
                             <a:rPr lang="en-US" i="1">
-                              <a:latin typeface="Cambria Math" panose="02040503050406030204" pitchFamily="18" charset="0"/>
+                              <a:latin typeface="Cambria Math" charset="0"/>
                             </a:rPr>
                           </m:ctrlPr>
                         </m:sSupPr>
@@ -16217,7 +16217,7 @@
                           <m:supHide m:val="on"/>
                           <m:ctrlPr>
                             <a:rPr lang="en-US" i="1">
-                              <a:latin typeface="Cambria Math" panose="02040503050406030204" pitchFamily="18" charset="0"/>
+                              <a:latin typeface="Cambria Math" charset="0"/>
                             </a:rPr>
                           </m:ctrlPr>
                         </m:naryPr>
@@ -16235,7 +16235,7 @@
                             <m:sSubPr>
                               <m:ctrlPr>
                                 <a:rPr lang="en-US" i="1">
-                                  <a:latin typeface="Cambria Math" panose="02040503050406030204" pitchFamily="18" charset="0"/>
+                                  <a:latin typeface="Cambria Math" charset="0"/>
                                 </a:rPr>
                               </m:ctrlPr>
                             </m:sSubPr>
@@ -16266,7 +16266,7 @@
                             <m:sSubPr>
                               <m:ctrlPr>
                                 <a:rPr lang="en-US" i="1">
-                                  <a:latin typeface="Cambria Math" panose="02040503050406030204" pitchFamily="18" charset="0"/>
+                                  <a:latin typeface="Cambria Math" charset="0"/>
                                 </a:rPr>
                               </m:ctrlPr>
                             </m:sSubPr>
@@ -16313,7 +16313,7 @@
                           <m:supHide m:val="on"/>
                           <m:ctrlPr>
                             <a:rPr lang="en-US" i="1">
-                              <a:latin typeface="Cambria Math" panose="02040503050406030204" pitchFamily="18" charset="0"/>
+                              <a:latin typeface="Cambria Math" charset="0"/>
                             </a:rPr>
                           </m:ctrlPr>
                         </m:naryPr>
@@ -16331,7 +16331,7 @@
                             <m:sSubPr>
                               <m:ctrlPr>
                                 <a:rPr lang="en-US" i="1">
-                                  <a:latin typeface="Cambria Math" panose="02040503050406030204" pitchFamily="18" charset="0"/>
+                                  <a:latin typeface="Cambria Math" charset="0"/>
                                 </a:rPr>
                               </m:ctrlPr>
                             </m:sSubPr>
@@ -16357,7 +16357,7 @@
                               <m:degHide m:val="on"/>
                               <m:ctrlPr>
                                 <a:rPr lang="en-US" i="1">
-                                  <a:latin typeface="Cambria Math" panose="02040503050406030204" pitchFamily="18" charset="0"/>
+                                  <a:latin typeface="Cambria Math" charset="0"/>
                                 </a:rPr>
                               </m:ctrlPr>
                             </m:radPr>
@@ -16367,7 +16367,7 @@
                                 <m:sSubSupPr>
                                   <m:ctrlPr>
                                     <a:rPr lang="en-US" i="1">
-                                      <a:latin typeface="Cambria Math" panose="02040503050406030204" pitchFamily="18" charset="0"/>
+                                      <a:latin typeface="Cambria Math" charset="0"/>
                                     </a:rPr>
                                   </m:ctrlPr>
                                 </m:sSubSupPr>
@@ -16406,7 +16406,7 @@
                                 <m:sSubSupPr>
                                   <m:ctrlPr>
                                     <a:rPr lang="en-US" i="1">
-                                      <a:latin typeface="Cambria Math" panose="02040503050406030204" pitchFamily="18" charset="0"/>
+                                      <a:latin typeface="Cambria Math" charset="0"/>
                                     </a:rPr>
                                   </m:ctrlPr>
                                 </m:sSubSupPr>
@@ -16467,7 +16467,7 @@
                         <m:sSubSupPr>
                           <m:ctrlPr>
                             <a:rPr lang="en-US" b="0" i="1" smtClean="0">
-                              <a:latin typeface="Cambria Math" panose="02040503050406030204" pitchFamily="18" charset="0"/>
+                              <a:latin typeface="Cambria Math" charset="0"/>
                             </a:rPr>
                           </m:ctrlPr>
                         </m:sSubSupPr>
@@ -16512,7 +16512,7 @@
                         <m:sSubSupPr>
                           <m:ctrlPr>
                             <a:rPr lang="en-US" b="0" i="1" smtClean="0">
-                              <a:latin typeface="Cambria Math" panose="02040503050406030204" pitchFamily="18" charset="0"/>
+                              <a:latin typeface="Cambria Math" charset="0"/>
                             </a:rPr>
                           </m:ctrlPr>
                         </m:sSubSupPr>
@@ -16566,7 +16566,7 @@
                       <m:sSupPr>
                         <m:ctrlPr>
                           <a:rPr lang="en-US" b="0" i="1" smtClean="0">
-                            <a:latin typeface="Cambria Math" panose="02040503050406030204" pitchFamily="18" charset="0"/>
+                            <a:latin typeface="Cambria Math" charset="0"/>
                           </a:rPr>
                         </m:ctrlPr>
                       </m:sSupPr>
@@ -16611,7 +16611,7 @@
                         <m:endChr m:val="]"/>
                         <m:ctrlPr>
                           <a:rPr lang="en-US" b="0" i="1" smtClean="0">
-                            <a:latin typeface="Cambria Math" panose="02040503050406030204" pitchFamily="18" charset="0"/>
+                            <a:latin typeface="Cambria Math" charset="0"/>
                           </a:rPr>
                         </m:ctrlPr>
                       </m:dPr>
@@ -16620,7 +16620,7 @@
                           <m:sSubPr>
                             <m:ctrlPr>
                               <a:rPr lang="en-US" b="0" i="1" smtClean="0">
-                                <a:latin typeface="Cambria Math" panose="02040503050406030204" pitchFamily="18" charset="0"/>
+                                <a:latin typeface="Cambria Math" charset="0"/>
                               </a:rPr>
                             </m:ctrlPr>
                           </m:sSubPr>
@@ -16663,7 +16663,7 @@
                           <m:sSubPr>
                             <m:ctrlPr>
                               <a:rPr lang="en-US" b="0" i="1" smtClean="0">
-                                <a:latin typeface="Cambria Math" panose="02040503050406030204" pitchFamily="18" charset="0"/>
+                                <a:latin typeface="Cambria Math" charset="0"/>
                               </a:rPr>
                             </m:ctrlPr>
                           </m:sSubPr>
@@ -16739,7 +16739,7 @@
                         <m:sSubPr>
                           <m:ctrlPr>
                             <a:rPr lang="en-US" b="0" i="1" smtClean="0">
-                              <a:latin typeface="Cambria Math" panose="02040503050406030204" pitchFamily="18" charset="0"/>
+                              <a:latin typeface="Cambria Math" charset="0"/>
                             </a:rPr>
                           </m:ctrlPr>
                         </m:sSubPr>
@@ -16766,28 +16766,36 @@
                         </a:rPr>
                         <m:t>=∥</m:t>
                       </m:r>
-                      <m:sSup>
-                        <m:sSupPr>
+                      <m:sSubSup>
+                        <m:sSubSupPr>
                           <m:ctrlPr>
                             <a:rPr lang="en-US" b="0" i="1" smtClean="0">
-                              <a:latin typeface="Cambria Math" panose="02040503050406030204" pitchFamily="18" charset="0"/>
+                              <a:latin typeface="Cambria Math" charset="0"/>
                             </a:rPr>
                           </m:ctrlPr>
-                        </m:sSupPr>
+                        </m:sSubSupPr>
                         <m:e>
                           <m:r>
                             <a:rPr lang="en-US" b="0" i="1" smtClean="0">
-                              <a:latin typeface="Cambria Math" panose="02040503050406030204" pitchFamily="18" charset="0"/>
+                              <a:latin typeface="Cambria Math" charset="0"/>
                             </a:rPr>
-                            <m:t>𝑋</m:t>
+                            <m:t>𝐺</m:t>
                           </m:r>
                         </m:e>
+                        <m:sub>
+                          <m:r>
+                            <a:rPr lang="en-US" b="0" i="1" smtClean="0">
+                              <a:latin typeface="Cambria Math" charset="0"/>
+                            </a:rPr>
+                            <m:t>𝑗</m:t>
+                          </m:r>
+                        </m:sub>
                         <m:sup>
                           <m:d>
                             <m:dPr>
                               <m:ctrlPr>
                                 <a:rPr lang="en-US" b="0" i="1" smtClean="0">
-                                  <a:latin typeface="Cambria Math" panose="02040503050406030204" pitchFamily="18" charset="0"/>
+                                  <a:latin typeface="Cambria Math" charset="0"/>
                                 </a:rPr>
                               </m:ctrlPr>
                             </m:dPr>
@@ -16801,12 +16809,12 @@
                             </m:e>
                           </m:d>
                         </m:sup>
-                      </m:sSup>
+                      </m:sSubSup>
                       <m:sSub>
                         <m:sSubPr>
                           <m:ctrlPr>
                             <a:rPr lang="en-US" b="0" i="1" smtClean="0">
-                              <a:latin typeface="Cambria Math" panose="02040503050406030204" pitchFamily="18" charset="0"/>
+                              <a:latin typeface="Cambria Math" charset="0"/>
                             </a:rPr>
                           </m:ctrlPr>
                         </m:sSubPr>
@@ -16846,7 +16854,7 @@
                         <m:sSubPr>
                           <m:ctrlPr>
                             <a:rPr lang="en-US" b="0" i="1" smtClean="0">
-                              <a:latin typeface="Cambria Math" panose="02040503050406030204" pitchFamily="18" charset="0"/>
+                              <a:latin typeface="Cambria Math" charset="0"/>
                             </a:rPr>
                           </m:ctrlPr>
                         </m:sSubPr>
@@ -16878,7 +16886,7 @@
                           <m:degHide m:val="on"/>
                           <m:ctrlPr>
                             <a:rPr lang="en-US" b="0" i="1" smtClean="0">
-                              <a:latin typeface="Cambria Math" panose="02040503050406030204" pitchFamily="18" charset="0"/>
+                              <a:latin typeface="Cambria Math" charset="0"/>
                             </a:rPr>
                           </m:ctrlPr>
                         </m:radPr>
@@ -16894,7 +16902,7 @@
                             <m:sSubPr>
                               <m:ctrlPr>
                                 <a:rPr lang="en-US" b="0" i="1" smtClean="0">
-                                  <a:latin typeface="Cambria Math" panose="02040503050406030204" pitchFamily="18" charset="0"/>
+                                  <a:latin typeface="Cambria Math" charset="0"/>
                                 </a:rPr>
                               </m:ctrlPr>
                             </m:sSubPr>
@@ -16919,7 +16927,7 @@
                             <m:sSubSupPr>
                               <m:ctrlPr>
                                 <a:rPr lang="en-US" b="0" i="1" smtClean="0">
-                                  <a:latin typeface="Cambria Math" panose="02040503050406030204" pitchFamily="18" charset="0"/>
+                                  <a:latin typeface="Cambria Math" charset="0"/>
                                 </a:rPr>
                               </m:ctrlPr>
                             </m:sSubSupPr>
@@ -16958,7 +16966,7 @@
                             <m:dPr>
                               <m:ctrlPr>
                                 <a:rPr lang="en-US" b="0" i="1" smtClean="0">
-                                  <a:latin typeface="Cambria Math" panose="02040503050406030204" pitchFamily="18" charset="0"/>
+                                  <a:latin typeface="Cambria Math" charset="0"/>
                                 </a:rPr>
                               </m:ctrlPr>
                             </m:dPr>
@@ -16974,7 +16982,7 @@
                                   <m:degHide m:val="on"/>
                                   <m:ctrlPr>
                                     <a:rPr lang="en-US" b="0" i="1" smtClean="0">
-                                      <a:latin typeface="Cambria Math" panose="02040503050406030204" pitchFamily="18" charset="0"/>
+                                      <a:latin typeface="Cambria Math" charset="0"/>
                                     </a:rPr>
                                   </m:ctrlPr>
                                 </m:radPr>
@@ -16984,7 +16992,7 @@
                                     <m:fPr>
                                       <m:ctrlPr>
                                         <a:rPr lang="en-US" b="0" i="1" smtClean="0">
-                                          <a:latin typeface="Cambria Math" panose="02040503050406030204" pitchFamily="18" charset="0"/>
+                                          <a:latin typeface="Cambria Math" charset="0"/>
                                         </a:rPr>
                                       </m:ctrlPr>
                                     </m:fPr>
@@ -17031,7 +17039,7 @@
                             <m:sSubPr>
                               <m:ctrlPr>
                                 <a:rPr lang="en-US" b="0" i="1" smtClean="0">
-                                  <a:latin typeface="Cambria Math" panose="02040503050406030204" pitchFamily="18" charset="0"/>
+                                  <a:latin typeface="Cambria Math" charset="0"/>
                                 </a:rPr>
                               </m:ctrlPr>
                             </m:sSubPr>
@@ -17056,7 +17064,7 @@
                             <m:sSubSupPr>
                               <m:ctrlPr>
                                 <a:rPr lang="en-US" b="0" i="1" smtClean="0">
-                                  <a:latin typeface="Cambria Math" panose="02040503050406030204" pitchFamily="18" charset="0"/>
+                                  <a:latin typeface="Cambria Math" charset="0"/>
                                 </a:rPr>
                               </m:ctrlPr>
                             </m:sSubSupPr>
@@ -17101,7 +17109,7 @@
             </p:txBody>
           </p:sp>
         </mc:Choice>
-        <mc:Fallback xmlns="">
+        <mc:Fallback>
           <p:sp>
             <p:nvSpPr>
               <p:cNvPr id="8" name="Content Placeholder 7">
@@ -18833,7 +18841,7 @@
           <p:cNvPr id="2" name="Title 1">
             <a:extLst>
               <a:ext uri="{FF2B5EF4-FFF2-40B4-BE49-F238E27FC236}">
-                <a16:creationId xmlns:a16="http://schemas.microsoft.com/office/drawing/2014/main" id="{17A8BB3D-2D35-4F66-AFB4-2A9AE7681862}"/>
+                <a16:creationId xmlns:a16="http://schemas.microsoft.com/office/drawing/2014/main" xmlns="" id="{17A8BB3D-2D35-4F66-AFB4-2A9AE7681862}"/>
               </a:ext>
             </a:extLst>
           </p:cNvPr>
@@ -18867,7 +18875,7 @@
           <p:cNvPr id="3" name="Footer Placeholder 2">
             <a:extLst>
               <a:ext uri="{FF2B5EF4-FFF2-40B4-BE49-F238E27FC236}">
-                <a16:creationId xmlns:a16="http://schemas.microsoft.com/office/drawing/2014/main" id="{11862E8A-91FD-4C41-A192-DB3D27D88824}"/>
+                <a16:creationId xmlns:a16="http://schemas.microsoft.com/office/drawing/2014/main" xmlns="" id="{11862E8A-91FD-4C41-A192-DB3D27D88824}"/>
               </a:ext>
             </a:extLst>
           </p:cNvPr>
@@ -18924,7 +18932,7 @@
           <p:cNvPr id="4" name="Slide Number Placeholder 3">
             <a:extLst>
               <a:ext uri="{FF2B5EF4-FFF2-40B4-BE49-F238E27FC236}">
-                <a16:creationId xmlns:a16="http://schemas.microsoft.com/office/drawing/2014/main" id="{9DA5ED20-07EE-4130-97A2-FC2FBDDF57B9}"/>
+                <a16:creationId xmlns:a16="http://schemas.microsoft.com/office/drawing/2014/main" xmlns="" id="{9DA5ED20-07EE-4130-97A2-FC2FBDDF57B9}"/>
               </a:ext>
             </a:extLst>
           </p:cNvPr>
@@ -18984,7 +18992,7 @@
           <p:cNvPr id="2" name="Title 1">
             <a:extLst>
               <a:ext uri="{FF2B5EF4-FFF2-40B4-BE49-F238E27FC236}">
-                <a16:creationId xmlns:a16="http://schemas.microsoft.com/office/drawing/2014/main" id="{C7D675AA-6913-48BC-85A2-5C1947B70467}"/>
+                <a16:creationId xmlns:a16="http://schemas.microsoft.com/office/drawing/2014/main" xmlns="" id="{C7D675AA-6913-48BC-85A2-5C1947B70467}"/>
               </a:ext>
             </a:extLst>
           </p:cNvPr>
@@ -19012,7 +19020,7 @@
           <p:cNvPr id="3" name="Content Placeholder 2">
             <a:extLst>
               <a:ext uri="{FF2B5EF4-FFF2-40B4-BE49-F238E27FC236}">
-                <a16:creationId xmlns:a16="http://schemas.microsoft.com/office/drawing/2014/main" id="{F79FB236-54CE-4723-A388-7B2C26E5DA92}"/>
+                <a16:creationId xmlns:a16="http://schemas.microsoft.com/office/drawing/2014/main" xmlns="" id="{F79FB236-54CE-4723-A388-7B2C26E5DA92}"/>
               </a:ext>
             </a:extLst>
           </p:cNvPr>
@@ -19121,7 +19129,7 @@
           <p:cNvPr id="4" name="Footer Placeholder 3">
             <a:extLst>
               <a:ext uri="{FF2B5EF4-FFF2-40B4-BE49-F238E27FC236}">
-                <a16:creationId xmlns:a16="http://schemas.microsoft.com/office/drawing/2014/main" id="{BDDDA0BE-FB94-44D9-8026-4299635DFDB4}"/>
+                <a16:creationId xmlns:a16="http://schemas.microsoft.com/office/drawing/2014/main" xmlns="" id="{BDDDA0BE-FB94-44D9-8026-4299635DFDB4}"/>
               </a:ext>
             </a:extLst>
           </p:cNvPr>
@@ -19178,7 +19186,7 @@
           <p:cNvPr id="5" name="Slide Number Placeholder 4">
             <a:extLst>
               <a:ext uri="{FF2B5EF4-FFF2-40B4-BE49-F238E27FC236}">
-                <a16:creationId xmlns:a16="http://schemas.microsoft.com/office/drawing/2014/main" id="{89272EAA-7658-4CAB-B263-CD4B022CF97A}"/>
+                <a16:creationId xmlns:a16="http://schemas.microsoft.com/office/drawing/2014/main" xmlns="" id="{89272EAA-7658-4CAB-B263-CD4B022CF97A}"/>
               </a:ext>
             </a:extLst>
           </p:cNvPr>
@@ -19698,7 +19706,7 @@
           <p:cNvPr id="2" name="Title 1">
             <a:extLst>
               <a:ext uri="{FF2B5EF4-FFF2-40B4-BE49-F238E27FC236}">
-                <a16:creationId xmlns:a16="http://schemas.microsoft.com/office/drawing/2014/main" id="{11087D96-4F48-402C-9A22-A3A89A572F75}"/>
+                <a16:creationId xmlns:a16="http://schemas.microsoft.com/office/drawing/2014/main" xmlns="" id="{11087D96-4F48-402C-9A22-A3A89A572F75}"/>
               </a:ext>
             </a:extLst>
           </p:cNvPr>
@@ -19726,7 +19734,7 @@
           <p:cNvPr id="3" name="Content Placeholder 2">
             <a:extLst>
               <a:ext uri="{FF2B5EF4-FFF2-40B4-BE49-F238E27FC236}">
-                <a16:creationId xmlns:a16="http://schemas.microsoft.com/office/drawing/2014/main" id="{F03F415E-2814-47D8-8986-8A3A951F9052}"/>
+                <a16:creationId xmlns:a16="http://schemas.microsoft.com/office/drawing/2014/main" xmlns="" id="{F03F415E-2814-47D8-8986-8A3A951F9052}"/>
               </a:ext>
             </a:extLst>
           </p:cNvPr>
@@ -19768,7 +19776,7 @@
           <p:cNvPr id="4" name="Footer Placeholder 3">
             <a:extLst>
               <a:ext uri="{FF2B5EF4-FFF2-40B4-BE49-F238E27FC236}">
-                <a16:creationId xmlns:a16="http://schemas.microsoft.com/office/drawing/2014/main" id="{8624D5AE-8946-4C90-850A-598E06BFD2C8}"/>
+                <a16:creationId xmlns:a16="http://schemas.microsoft.com/office/drawing/2014/main" xmlns="" id="{8624D5AE-8946-4C90-850A-598E06BFD2C8}"/>
               </a:ext>
             </a:extLst>
           </p:cNvPr>
@@ -19825,7 +19833,7 @@
           <p:cNvPr id="5" name="Slide Number Placeholder 4">
             <a:extLst>
               <a:ext uri="{FF2B5EF4-FFF2-40B4-BE49-F238E27FC236}">
-                <a16:creationId xmlns:a16="http://schemas.microsoft.com/office/drawing/2014/main" id="{C338FA2D-196C-4DEF-97C9-AFD64AE6FD17}"/>
+                <a16:creationId xmlns:a16="http://schemas.microsoft.com/office/drawing/2014/main" xmlns="" id="{C338FA2D-196C-4DEF-97C9-AFD64AE6FD17}"/>
               </a:ext>
             </a:extLst>
           </p:cNvPr>
@@ -19855,7 +19863,7 @@
           <p:cNvPr id="6" name="Rectangle 5">
             <a:extLst>
               <a:ext uri="{FF2B5EF4-FFF2-40B4-BE49-F238E27FC236}">
-                <a16:creationId xmlns:a16="http://schemas.microsoft.com/office/drawing/2014/main" id="{A9CE8327-D90B-419B-AEA4-71B82617F441}"/>
+                <a16:creationId xmlns:a16="http://schemas.microsoft.com/office/drawing/2014/main" xmlns="" id="{A9CE8327-D90B-419B-AEA4-71B82617F441}"/>
               </a:ext>
             </a:extLst>
           </p:cNvPr>
@@ -19904,7 +19912,7 @@
           <p:cNvPr id="7" name="Rectangle 6">
             <a:extLst>
               <a:ext uri="{FF2B5EF4-FFF2-40B4-BE49-F238E27FC236}">
-                <a16:creationId xmlns:a16="http://schemas.microsoft.com/office/drawing/2014/main" id="{1FD7498B-D752-4299-93F1-89F70E6DC4C9}"/>
+                <a16:creationId xmlns:a16="http://schemas.microsoft.com/office/drawing/2014/main" xmlns="" id="{1FD7498B-D752-4299-93F1-89F70E6DC4C9}"/>
               </a:ext>
             </a:extLst>
           </p:cNvPr>
@@ -19958,7 +19966,7 @@
           <p:cNvPr id="8" name="Rectangle 7">
             <a:extLst>
               <a:ext uri="{FF2B5EF4-FFF2-40B4-BE49-F238E27FC236}">
-                <a16:creationId xmlns:a16="http://schemas.microsoft.com/office/drawing/2014/main" id="{E943E299-3DD3-4BDC-872E-A723F2FEC289}"/>
+                <a16:creationId xmlns:a16="http://schemas.microsoft.com/office/drawing/2014/main" xmlns="" id="{E943E299-3DD3-4BDC-872E-A723F2FEC289}"/>
               </a:ext>
             </a:extLst>
           </p:cNvPr>
@@ -20007,7 +20015,7 @@
           <p:cNvPr id="9" name="Rectangle 8">
             <a:extLst>
               <a:ext uri="{FF2B5EF4-FFF2-40B4-BE49-F238E27FC236}">
-                <a16:creationId xmlns:a16="http://schemas.microsoft.com/office/drawing/2014/main" id="{7EC04703-0934-4088-8C30-08DC833DCA54}"/>
+                <a16:creationId xmlns:a16="http://schemas.microsoft.com/office/drawing/2014/main" xmlns="" id="{7EC04703-0934-4088-8C30-08DC833DCA54}"/>
               </a:ext>
             </a:extLst>
           </p:cNvPr>
@@ -20061,7 +20069,7 @@
           <p:cNvPr id="10" name="TextBox 9">
             <a:extLst>
               <a:ext uri="{FF2B5EF4-FFF2-40B4-BE49-F238E27FC236}">
-                <a16:creationId xmlns:a16="http://schemas.microsoft.com/office/drawing/2014/main" id="{F2C16A90-5E97-4B18-984B-B7C50B1073AA}"/>
+                <a16:creationId xmlns:a16="http://schemas.microsoft.com/office/drawing/2014/main" xmlns="" id="{F2C16A90-5E97-4B18-984B-B7C50B1073AA}"/>
               </a:ext>
             </a:extLst>
           </p:cNvPr>
@@ -20100,7 +20108,7 @@
           <p:cNvPr id="12" name="TextBox 11">
             <a:extLst>
               <a:ext uri="{FF2B5EF4-FFF2-40B4-BE49-F238E27FC236}">
-                <a16:creationId xmlns:a16="http://schemas.microsoft.com/office/drawing/2014/main" id="{EE2234DA-6987-4ED4-BA76-BA3ABA99CCB9}"/>
+                <a16:creationId xmlns:a16="http://schemas.microsoft.com/office/drawing/2014/main" xmlns="" id="{EE2234DA-6987-4ED4-BA76-BA3ABA99CCB9}"/>
               </a:ext>
             </a:extLst>
           </p:cNvPr>
@@ -20139,7 +20147,7 @@
           <p:cNvPr id="14" name="TextBox 13">
             <a:extLst>
               <a:ext uri="{FF2B5EF4-FFF2-40B4-BE49-F238E27FC236}">
-                <a16:creationId xmlns:a16="http://schemas.microsoft.com/office/drawing/2014/main" id="{6BD26A27-FC2B-4AAD-9133-6B217D6FB28F}"/>
+                <a16:creationId xmlns:a16="http://schemas.microsoft.com/office/drawing/2014/main" xmlns="" id="{6BD26A27-FC2B-4AAD-9133-6B217D6FB28F}"/>
               </a:ext>
             </a:extLst>
           </p:cNvPr>
@@ -20174,7 +20182,7 @@
           <p:cNvPr id="15" name="TextBox 14">
             <a:extLst>
               <a:ext uri="{FF2B5EF4-FFF2-40B4-BE49-F238E27FC236}">
-                <a16:creationId xmlns:a16="http://schemas.microsoft.com/office/drawing/2014/main" id="{BD939FD6-633E-419B-B7F1-B9F75651991B}"/>
+                <a16:creationId xmlns:a16="http://schemas.microsoft.com/office/drawing/2014/main" xmlns="" id="{BD939FD6-633E-419B-B7F1-B9F75651991B}"/>
               </a:ext>
             </a:extLst>
           </p:cNvPr>
@@ -20209,7 +20217,7 @@
           <p:cNvPr id="16" name="Right Brace 15">
             <a:extLst>
               <a:ext uri="{FF2B5EF4-FFF2-40B4-BE49-F238E27FC236}">
-                <a16:creationId xmlns:a16="http://schemas.microsoft.com/office/drawing/2014/main" id="{F2F2FAEA-93F8-4C3F-938B-B013F8C832BF}"/>
+                <a16:creationId xmlns:a16="http://schemas.microsoft.com/office/drawing/2014/main" xmlns="" id="{F2F2FAEA-93F8-4C3F-938B-B013F8C832BF}"/>
               </a:ext>
             </a:extLst>
           </p:cNvPr>
@@ -20255,7 +20263,7 @@
               <p:cNvPr id="17" name="TextBox 16">
                 <a:extLst>
                   <a:ext uri="{FF2B5EF4-FFF2-40B4-BE49-F238E27FC236}">
-                    <a16:creationId xmlns:a16="http://schemas.microsoft.com/office/drawing/2014/main" id="{E379FFCB-270F-42B0-A13C-5284701B20EF}"/>
+                    <a16:creationId xmlns:a16="http://schemas.microsoft.com/office/drawing/2014/main" xmlns="" id="{E379FFCB-270F-42B0-A13C-5284701B20EF}"/>
                   </a:ext>
                 </a:extLst>
               </p:cNvPr>
@@ -20348,7 +20356,7 @@
               <p:cNvPr id="11" name="TextBox 10">
                 <a:extLst>
                   <a:ext uri="{FF2B5EF4-FFF2-40B4-BE49-F238E27FC236}">
-                    <a16:creationId xmlns:a16="http://schemas.microsoft.com/office/drawing/2014/main" id="{DDC5DD18-D812-43C2-9EC9-E1F020D834D6}"/>
+                    <a16:creationId xmlns:a16="http://schemas.microsoft.com/office/drawing/2014/main" xmlns="" id="{DDC5DD18-D812-43C2-9EC9-E1F020D834D6}"/>
                   </a:ext>
                 </a:extLst>
               </p:cNvPr>
@@ -20444,7 +20452,7 @@
               <p:cNvPr id="18" name="TextBox 17">
                 <a:extLst>
                   <a:ext uri="{FF2B5EF4-FFF2-40B4-BE49-F238E27FC236}">
-                    <a16:creationId xmlns:a16="http://schemas.microsoft.com/office/drawing/2014/main" id="{FA32C9F3-6CD8-4695-9D77-2E0F33F0A1AF}"/>
+                    <a16:creationId xmlns:a16="http://schemas.microsoft.com/office/drawing/2014/main" xmlns="" id="{FA32C9F3-6CD8-4695-9D77-2E0F33F0A1AF}"/>
                   </a:ext>
                 </a:extLst>
               </p:cNvPr>
@@ -21190,7 +21198,7 @@
           <p:cNvPr id="2" name="Title 1">
             <a:extLst>
               <a:ext uri="{FF2B5EF4-FFF2-40B4-BE49-F238E27FC236}">
-                <a16:creationId xmlns:a16="http://schemas.microsoft.com/office/drawing/2014/main" id="{7483EDA4-B6D3-49E9-B6F9-35CE16B276B8}"/>
+                <a16:creationId xmlns:a16="http://schemas.microsoft.com/office/drawing/2014/main" xmlns="" id="{7483EDA4-B6D3-49E9-B6F9-35CE16B276B8}"/>
               </a:ext>
             </a:extLst>
           </p:cNvPr>
@@ -21218,7 +21226,7 @@
           <p:cNvPr id="8" name="Content Placeholder 7" descr="A close up of a device&#10;&#10;Description generated with high confidence">
             <a:extLst>
               <a:ext uri="{FF2B5EF4-FFF2-40B4-BE49-F238E27FC236}">
-                <a16:creationId xmlns:a16="http://schemas.microsoft.com/office/drawing/2014/main" id="{8CE1E0D6-6F26-4032-8800-2CF4E7F2996F}"/>
+                <a16:creationId xmlns:a16="http://schemas.microsoft.com/office/drawing/2014/main" xmlns="" id="{8CE1E0D6-6F26-4032-8800-2CF4E7F2996F}"/>
               </a:ext>
             </a:extLst>
           </p:cNvPr>
@@ -21255,7 +21263,7 @@
               <p:cNvPr id="4" name="Text Placeholder 3">
                 <a:extLst>
                   <a:ext uri="{FF2B5EF4-FFF2-40B4-BE49-F238E27FC236}">
-                    <a16:creationId xmlns:a16="http://schemas.microsoft.com/office/drawing/2014/main" id="{B6C5B79B-0970-4BFB-91A9-E1CB31566408}"/>
+                    <a16:creationId xmlns:a16="http://schemas.microsoft.com/office/drawing/2014/main" xmlns="" id="{B6C5B79B-0970-4BFB-91A9-E1CB31566408}"/>
                   </a:ext>
                 </a:extLst>
               </p:cNvPr>
@@ -21286,7 +21294,7 @@
                       <m:sSubPr>
                         <m:ctrlPr>
                           <a:rPr lang="en-US" sz="1800" i="1">
-                            <a:latin typeface="Cambria Math" panose="02040503050406030204" pitchFamily="18" charset="0"/>
+                            <a:latin typeface="Cambria Math" charset="0"/>
                           </a:rPr>
                         </m:ctrlPr>
                       </m:sSubPr>
@@ -21329,7 +21337,7 @@
                       <m:sSupPr>
                         <m:ctrlPr>
                           <a:rPr lang="en-US" sz="1800" i="1">
-                            <a:latin typeface="Cambria Math" panose="02040503050406030204" pitchFamily="18" charset="0"/>
+                            <a:latin typeface="Cambria Math" charset="0"/>
                           </a:rPr>
                         </m:ctrlPr>
                       </m:sSupPr>
@@ -21348,7 +21356,7 @@
                             <m:endChr m:val="|"/>
                             <m:ctrlPr>
                               <a:rPr lang="en-US" sz="1800" i="1">
-                                <a:latin typeface="Cambria Math" panose="02040503050406030204" pitchFamily="18" charset="0"/>
+                                <a:latin typeface="Cambria Math" charset="0"/>
                               </a:rPr>
                             </m:ctrlPr>
                           </m:dPr>
@@ -21437,7 +21445,7 @@
           <p:cNvPr id="5" name="Footer Placeholder 4">
             <a:extLst>
               <a:ext uri="{FF2B5EF4-FFF2-40B4-BE49-F238E27FC236}">
-                <a16:creationId xmlns:a16="http://schemas.microsoft.com/office/drawing/2014/main" id="{A43AD325-324B-46FB-8992-11B6F48344A5}"/>
+                <a16:creationId xmlns:a16="http://schemas.microsoft.com/office/drawing/2014/main" xmlns="" id="{A43AD325-324B-46FB-8992-11B6F48344A5}"/>
               </a:ext>
             </a:extLst>
           </p:cNvPr>
@@ -21494,7 +21502,7 @@
           <p:cNvPr id="6" name="Slide Number Placeholder 5">
             <a:extLst>
               <a:ext uri="{FF2B5EF4-FFF2-40B4-BE49-F238E27FC236}">
-                <a16:creationId xmlns:a16="http://schemas.microsoft.com/office/drawing/2014/main" id="{DC82B01A-3AFA-492D-BC99-4E071A260616}"/>
+                <a16:creationId xmlns:a16="http://schemas.microsoft.com/office/drawing/2014/main" xmlns="" id="{DC82B01A-3AFA-492D-BC99-4E071A260616}"/>
               </a:ext>
             </a:extLst>
           </p:cNvPr>
@@ -21524,7 +21532,7 @@
           <p:cNvPr id="9" name="Title 1">
             <a:extLst>
               <a:ext uri="{FF2B5EF4-FFF2-40B4-BE49-F238E27FC236}">
-                <a16:creationId xmlns:a16="http://schemas.microsoft.com/office/drawing/2014/main" id="{4F33CCF8-87B5-4D8D-A941-8EB5582DF6A2}"/>
+                <a16:creationId xmlns:a16="http://schemas.microsoft.com/office/drawing/2014/main" xmlns="" id="{4F33CCF8-87B5-4D8D-A941-8EB5582DF6A2}"/>
               </a:ext>
             </a:extLst>
           </p:cNvPr>
@@ -21590,7 +21598,7 @@
               <p:cNvPr id="10" name="Text Placeholder 3">
                 <a:extLst>
                   <a:ext uri="{FF2B5EF4-FFF2-40B4-BE49-F238E27FC236}">
-                    <a16:creationId xmlns:a16="http://schemas.microsoft.com/office/drawing/2014/main" id="{5E65C462-EF0B-4F14-92B6-DD92E82EA8D2}"/>
+                    <a16:creationId xmlns:a16="http://schemas.microsoft.com/office/drawing/2014/main" xmlns="" id="{5E65C462-EF0B-4F14-92B6-DD92E82EA8D2}"/>
                   </a:ext>
                 </a:extLst>
               </p:cNvPr>
@@ -21852,7 +21860,7 @@
                       <m:fPr>
                         <m:ctrlPr>
                           <a:rPr lang="en-US" sz="1800" i="1">
-                            <a:latin typeface="Cambria Math" panose="02040503050406030204" pitchFamily="18" charset="0"/>
+                            <a:latin typeface="Cambria Math" charset="0"/>
                           </a:rPr>
                         </m:ctrlPr>
                       </m:fPr>
@@ -21873,7 +21881,7 @@
                           <m:sSubPr>
                             <m:ctrlPr>
                               <a:rPr lang="en-US" sz="1800" i="1">
-                                <a:latin typeface="Cambria Math" panose="02040503050406030204" pitchFamily="18" charset="0"/>
+                                <a:latin typeface="Cambria Math" charset="0"/>
                               </a:rPr>
                             </m:ctrlPr>
                           </m:sSubPr>
@@ -21953,7 +21961,7 @@
                       <m:sSubPr>
                         <m:ctrlPr>
                           <a:rPr lang="en-US" sz="1800" i="1">
-                            <a:latin typeface="Cambria Math" panose="02040503050406030204" pitchFamily="18" charset="0"/>
+                            <a:latin typeface="Cambria Math" charset="0"/>
                           </a:rPr>
                         </m:ctrlPr>
                       </m:sSubPr>
@@ -22047,7 +22055,7 @@
           <p:cNvPr id="11" name="Title 1">
             <a:extLst>
               <a:ext uri="{FF2B5EF4-FFF2-40B4-BE49-F238E27FC236}">
-                <a16:creationId xmlns:a16="http://schemas.microsoft.com/office/drawing/2014/main" id="{E17ECA68-FF04-4278-9440-FC0B19DC7E0C}"/>
+                <a16:creationId xmlns:a16="http://schemas.microsoft.com/office/drawing/2014/main" xmlns="" id="{E17ECA68-FF04-4278-9440-FC0B19DC7E0C}"/>
               </a:ext>
             </a:extLst>
           </p:cNvPr>
@@ -22263,7 +22271,7 @@
           <p:cNvPr id="2" name="Title 1">
             <a:extLst>
               <a:ext uri="{FF2B5EF4-FFF2-40B4-BE49-F238E27FC236}">
-                <a16:creationId xmlns:a16="http://schemas.microsoft.com/office/drawing/2014/main" id="{F4C23E1A-E65F-45E3-B3EB-E57706C09C8B}"/>
+                <a16:creationId xmlns:a16="http://schemas.microsoft.com/office/drawing/2014/main" xmlns="" id="{F4C23E1A-E65F-45E3-B3EB-E57706C09C8B}"/>
               </a:ext>
             </a:extLst>
           </p:cNvPr>
@@ -22291,7 +22299,7 @@
           <p:cNvPr id="6" name="Content Placeholder 5">
             <a:extLst>
               <a:ext uri="{FF2B5EF4-FFF2-40B4-BE49-F238E27FC236}">
-                <a16:creationId xmlns:a16="http://schemas.microsoft.com/office/drawing/2014/main" id="{6967B0B5-D35B-4A22-A314-443746DAC817}"/>
+                <a16:creationId xmlns:a16="http://schemas.microsoft.com/office/drawing/2014/main" xmlns="" id="{6967B0B5-D35B-4A22-A314-443746DAC817}"/>
               </a:ext>
             </a:extLst>
           </p:cNvPr>
@@ -22321,35 +22329,35 @@
                 <a:gridCol w="1656397">
                   <a:extLst>
                     <a:ext uri="{9D8B030D-6E8A-4147-A177-3AD203B41FA5}">
-                      <a16:colId xmlns:a16="http://schemas.microsoft.com/office/drawing/2014/main" val="739102875"/>
+                      <a16:colId xmlns:a16="http://schemas.microsoft.com/office/drawing/2014/main" xmlns="" val="739102875"/>
                     </a:ext>
                   </a:extLst>
                 </a:gridCol>
                 <a:gridCol w="1656397">
                   <a:extLst>
                     <a:ext uri="{9D8B030D-6E8A-4147-A177-3AD203B41FA5}">
-                      <a16:colId xmlns:a16="http://schemas.microsoft.com/office/drawing/2014/main" val="3414489019"/>
+                      <a16:colId xmlns:a16="http://schemas.microsoft.com/office/drawing/2014/main" xmlns="" val="3414489019"/>
                     </a:ext>
                   </a:extLst>
                 </a:gridCol>
                 <a:gridCol w="1656397">
                   <a:extLst>
                     <a:ext uri="{9D8B030D-6E8A-4147-A177-3AD203B41FA5}">
-                      <a16:colId xmlns:a16="http://schemas.microsoft.com/office/drawing/2014/main" val="2900459187"/>
+                      <a16:colId xmlns:a16="http://schemas.microsoft.com/office/drawing/2014/main" xmlns="" val="2900459187"/>
                     </a:ext>
                   </a:extLst>
                 </a:gridCol>
                 <a:gridCol w="1656397">
                   <a:extLst>
                     <a:ext uri="{9D8B030D-6E8A-4147-A177-3AD203B41FA5}">
-                      <a16:colId xmlns:a16="http://schemas.microsoft.com/office/drawing/2014/main" val="2175912481"/>
+                      <a16:colId xmlns:a16="http://schemas.microsoft.com/office/drawing/2014/main" xmlns="" val="2175912481"/>
                     </a:ext>
                   </a:extLst>
                 </a:gridCol>
                 <a:gridCol w="1656397">
                   <a:extLst>
                     <a:ext uri="{9D8B030D-6E8A-4147-A177-3AD203B41FA5}">
-                      <a16:colId xmlns:a16="http://schemas.microsoft.com/office/drawing/2014/main" val="1202905979"/>
+                      <a16:colId xmlns:a16="http://schemas.microsoft.com/office/drawing/2014/main" xmlns="" val="1202905979"/>
                     </a:ext>
                   </a:extLst>
                 </a:gridCol>
@@ -22423,7 +22431,7 @@
                 </a:tc>
                 <a:extLst>
                   <a:ext uri="{0D108BD9-81ED-4DB2-BD59-A6C34878D82A}">
-                    <a16:rowId xmlns:a16="http://schemas.microsoft.com/office/drawing/2014/main" val="1087788508"/>
+                    <a16:rowId xmlns:a16="http://schemas.microsoft.com/office/drawing/2014/main" xmlns="" val="1087788508"/>
                   </a:ext>
                 </a:extLst>
               </a:tr>
@@ -22522,7 +22530,7 @@
                 </a:tc>
                 <a:extLst>
                   <a:ext uri="{0D108BD9-81ED-4DB2-BD59-A6C34878D82A}">
-                    <a16:rowId xmlns:a16="http://schemas.microsoft.com/office/drawing/2014/main" val="1277102844"/>
+                    <a16:rowId xmlns:a16="http://schemas.microsoft.com/office/drawing/2014/main" xmlns="" val="1277102844"/>
                   </a:ext>
                 </a:extLst>
               </a:tr>
@@ -22606,7 +22614,7 @@
                 </a:tc>
                 <a:extLst>
                   <a:ext uri="{0D108BD9-81ED-4DB2-BD59-A6C34878D82A}">
-                    <a16:rowId xmlns:a16="http://schemas.microsoft.com/office/drawing/2014/main" val="3151828502"/>
+                    <a16:rowId xmlns:a16="http://schemas.microsoft.com/office/drawing/2014/main" xmlns="" val="3151828502"/>
                   </a:ext>
                 </a:extLst>
               </a:tr>
@@ -22690,7 +22698,7 @@
                 </a:tc>
                 <a:extLst>
                   <a:ext uri="{0D108BD9-81ED-4DB2-BD59-A6C34878D82A}">
-                    <a16:rowId xmlns:a16="http://schemas.microsoft.com/office/drawing/2014/main" val="607386248"/>
+                    <a16:rowId xmlns:a16="http://schemas.microsoft.com/office/drawing/2014/main" xmlns="" val="607386248"/>
                   </a:ext>
                 </a:extLst>
               </a:tr>
@@ -22797,7 +22805,7 @@
                 </a:tc>
                 <a:extLst>
                   <a:ext uri="{0D108BD9-81ED-4DB2-BD59-A6C34878D82A}">
-                    <a16:rowId xmlns:a16="http://schemas.microsoft.com/office/drawing/2014/main" val="4272911081"/>
+                    <a16:rowId xmlns:a16="http://schemas.microsoft.com/office/drawing/2014/main" xmlns="" val="4272911081"/>
                   </a:ext>
                 </a:extLst>
               </a:tr>
@@ -22810,7 +22818,7 @@
           <p:cNvPr id="4" name="Footer Placeholder 3">
             <a:extLst>
               <a:ext uri="{FF2B5EF4-FFF2-40B4-BE49-F238E27FC236}">
-                <a16:creationId xmlns:a16="http://schemas.microsoft.com/office/drawing/2014/main" id="{2D81FAF2-5569-44B7-B08D-B9E9332BCF80}"/>
+                <a16:creationId xmlns:a16="http://schemas.microsoft.com/office/drawing/2014/main" xmlns="" id="{2D81FAF2-5569-44B7-B08D-B9E9332BCF80}"/>
               </a:ext>
             </a:extLst>
           </p:cNvPr>
@@ -22867,7 +22875,7 @@
           <p:cNvPr id="5" name="Slide Number Placeholder 4">
             <a:extLst>
               <a:ext uri="{FF2B5EF4-FFF2-40B4-BE49-F238E27FC236}">
-                <a16:creationId xmlns:a16="http://schemas.microsoft.com/office/drawing/2014/main" id="{3B26AB91-3F16-449D-B663-A3317A22DD06}"/>
+                <a16:creationId xmlns:a16="http://schemas.microsoft.com/office/drawing/2014/main" xmlns="" id="{3B26AB91-3F16-449D-B663-A3317A22DD06}"/>
               </a:ext>
             </a:extLst>
           </p:cNvPr>
@@ -23125,7 +23133,7 @@
           <p:cNvPr id="2" name="Title 1">
             <a:extLst>
               <a:ext uri="{FF2B5EF4-FFF2-40B4-BE49-F238E27FC236}">
-                <a16:creationId xmlns:a16="http://schemas.microsoft.com/office/drawing/2014/main" id="{E9494603-1C22-4A8B-96DB-3D42D3B82802}"/>
+                <a16:creationId xmlns:a16="http://schemas.microsoft.com/office/drawing/2014/main" xmlns="" id="{E9494603-1C22-4A8B-96DB-3D42D3B82802}"/>
               </a:ext>
             </a:extLst>
           </p:cNvPr>
@@ -23153,7 +23161,7 @@
           <p:cNvPr id="3" name="Content Placeholder 2">
             <a:extLst>
               <a:ext uri="{FF2B5EF4-FFF2-40B4-BE49-F238E27FC236}">
-                <a16:creationId xmlns:a16="http://schemas.microsoft.com/office/drawing/2014/main" id="{84F0F037-A703-4FE5-A20E-E873E5DCE356}"/>
+                <a16:creationId xmlns:a16="http://schemas.microsoft.com/office/drawing/2014/main" xmlns="" id="{84F0F037-A703-4FE5-A20E-E873E5DCE356}"/>
               </a:ext>
             </a:extLst>
           </p:cNvPr>
@@ -23398,7 +23406,7 @@
           <p:cNvPr id="4" name="Footer Placeholder 3">
             <a:extLst>
               <a:ext uri="{FF2B5EF4-FFF2-40B4-BE49-F238E27FC236}">
-                <a16:creationId xmlns:a16="http://schemas.microsoft.com/office/drawing/2014/main" id="{E1B43182-D327-45AA-BBE2-67B83983E1E7}"/>
+                <a16:creationId xmlns:a16="http://schemas.microsoft.com/office/drawing/2014/main" xmlns="" id="{E1B43182-D327-45AA-BBE2-67B83983E1E7}"/>
               </a:ext>
             </a:extLst>
           </p:cNvPr>
@@ -23455,7 +23463,7 @@
           <p:cNvPr id="5" name="Slide Number Placeholder 4">
             <a:extLst>
               <a:ext uri="{FF2B5EF4-FFF2-40B4-BE49-F238E27FC236}">
-                <a16:creationId xmlns:a16="http://schemas.microsoft.com/office/drawing/2014/main" id="{32AFE35B-758B-4A31-A289-5F105EBA2AAD}"/>
+                <a16:creationId xmlns:a16="http://schemas.microsoft.com/office/drawing/2014/main" xmlns="" id="{32AFE35B-758B-4A31-A289-5F105EBA2AAD}"/>
               </a:ext>
             </a:extLst>
           </p:cNvPr>
@@ -24308,7 +24316,7 @@
           <p:cNvPr id="2" name="Title 1">
             <a:extLst>
               <a:ext uri="{FF2B5EF4-FFF2-40B4-BE49-F238E27FC236}">
-                <a16:creationId xmlns:a16="http://schemas.microsoft.com/office/drawing/2014/main" id="{72C3287B-4B25-4805-91C7-B2172474D766}"/>
+                <a16:creationId xmlns:a16="http://schemas.microsoft.com/office/drawing/2014/main" xmlns="" id="{72C3287B-4B25-4805-91C7-B2172474D766}"/>
               </a:ext>
             </a:extLst>
           </p:cNvPr>
@@ -24336,7 +24344,7 @@
           <p:cNvPr id="5" name="Footer Placeholder 4">
             <a:extLst>
               <a:ext uri="{FF2B5EF4-FFF2-40B4-BE49-F238E27FC236}">
-                <a16:creationId xmlns:a16="http://schemas.microsoft.com/office/drawing/2014/main" id="{9E138E50-124F-453E-8E9C-9827E3C89E2F}"/>
+                <a16:creationId xmlns:a16="http://schemas.microsoft.com/office/drawing/2014/main" xmlns="" id="{9E138E50-124F-453E-8E9C-9827E3C89E2F}"/>
               </a:ext>
             </a:extLst>
           </p:cNvPr>
@@ -24393,7 +24401,7 @@
           <p:cNvPr id="6" name="Slide Number Placeholder 5">
             <a:extLst>
               <a:ext uri="{FF2B5EF4-FFF2-40B4-BE49-F238E27FC236}">
-                <a16:creationId xmlns:a16="http://schemas.microsoft.com/office/drawing/2014/main" id="{73F6053E-02C5-4B4B-B1E2-45B43E0FBA01}"/>
+                <a16:creationId xmlns:a16="http://schemas.microsoft.com/office/drawing/2014/main" xmlns="" id="{73F6053E-02C5-4B4B-B1E2-45B43E0FBA01}"/>
               </a:ext>
             </a:extLst>
           </p:cNvPr>
@@ -24423,7 +24431,7 @@
           <p:cNvPr id="16" name="Content Placeholder 15" descr="A screenshot of a cell phone&#10;&#10;Description generated with very high confidence">
             <a:extLst>
               <a:ext uri="{FF2B5EF4-FFF2-40B4-BE49-F238E27FC236}">
-                <a16:creationId xmlns:a16="http://schemas.microsoft.com/office/drawing/2014/main" id="{94612C34-983C-4000-BDC0-79E9DA743399}"/>
+                <a16:creationId xmlns:a16="http://schemas.microsoft.com/office/drawing/2014/main" xmlns="" id="{94612C34-983C-4000-BDC0-79E9DA743399}"/>
               </a:ext>
             </a:extLst>
           </p:cNvPr>
@@ -24458,7 +24466,7 @@
           <p:cNvPr id="18" name="Content Placeholder 17" descr="A picture containing screenshot&#10;&#10;Description generated with very high confidence">
             <a:extLst>
               <a:ext uri="{FF2B5EF4-FFF2-40B4-BE49-F238E27FC236}">
-                <a16:creationId xmlns:a16="http://schemas.microsoft.com/office/drawing/2014/main" id="{9AE66F6C-3CE4-47F4-9BCA-5B6657878E04}"/>
+                <a16:creationId xmlns:a16="http://schemas.microsoft.com/office/drawing/2014/main" xmlns="" id="{9AE66F6C-3CE4-47F4-9BCA-5B6657878E04}"/>
               </a:ext>
             </a:extLst>
           </p:cNvPr>
@@ -24493,7 +24501,7 @@
           <p:cNvPr id="3" name="TextBox 2">
             <a:extLst>
               <a:ext uri="{FF2B5EF4-FFF2-40B4-BE49-F238E27FC236}">
-                <a16:creationId xmlns:a16="http://schemas.microsoft.com/office/drawing/2014/main" id="{FC70F91C-AE9D-41F1-B6A9-A8D8F345A35E}"/>
+                <a16:creationId xmlns:a16="http://schemas.microsoft.com/office/drawing/2014/main" xmlns="" id="{FC70F91C-AE9D-41F1-B6A9-A8D8F345A35E}"/>
               </a:ext>
             </a:extLst>
           </p:cNvPr>
@@ -24528,7 +24536,7 @@
           <p:cNvPr id="4" name="TextBox 3">
             <a:extLst>
               <a:ext uri="{FF2B5EF4-FFF2-40B4-BE49-F238E27FC236}">
-                <a16:creationId xmlns:a16="http://schemas.microsoft.com/office/drawing/2014/main" id="{428C33D5-4CF1-4837-95F2-154485EE50F9}"/>
+                <a16:creationId xmlns:a16="http://schemas.microsoft.com/office/drawing/2014/main" xmlns="" id="{428C33D5-4CF1-4837-95F2-154485EE50F9}"/>
               </a:ext>
             </a:extLst>
           </p:cNvPr>
@@ -24565,7 +24573,7 @@
               <p:cNvPr id="7" name="TextBox 6">
                 <a:extLst>
                   <a:ext uri="{FF2B5EF4-FFF2-40B4-BE49-F238E27FC236}">
-                    <a16:creationId xmlns:a16="http://schemas.microsoft.com/office/drawing/2014/main" id="{F3BC95E0-225D-465F-A17D-6A819012275B}"/>
+                    <a16:creationId xmlns:a16="http://schemas.microsoft.com/office/drawing/2014/main" xmlns="" id="{F3BC95E0-225D-465F-A17D-6A819012275B}"/>
                   </a:ext>
                 </a:extLst>
               </p:cNvPr>
@@ -24679,7 +24687,7 @@
           <p:cNvPr id="10" name="TextBox 9">
             <a:extLst>
               <a:ext uri="{FF2B5EF4-FFF2-40B4-BE49-F238E27FC236}">
-                <a16:creationId xmlns:a16="http://schemas.microsoft.com/office/drawing/2014/main" id="{43734ABD-6C9C-4485-B458-387B4DC38E0F}"/>
+                <a16:creationId xmlns:a16="http://schemas.microsoft.com/office/drawing/2014/main" xmlns="" id="{43734ABD-6C9C-4485-B458-387B4DC38E0F}"/>
               </a:ext>
             </a:extLst>
           </p:cNvPr>
@@ -24884,7 +24892,7 @@
           <p:cNvPr id="4" name="Content Placeholder 3">
             <a:extLst>
               <a:ext uri="{FF2B5EF4-FFF2-40B4-BE49-F238E27FC236}">
-                <a16:creationId xmlns:a16="http://schemas.microsoft.com/office/drawing/2014/main" id="{D880D59D-B966-4D03-9A27-2F273A7970B7}"/>
+                <a16:creationId xmlns:a16="http://schemas.microsoft.com/office/drawing/2014/main" xmlns="" id="{D880D59D-B966-4D03-9A27-2F273A7970B7}"/>
               </a:ext>
             </a:extLst>
           </p:cNvPr>
@@ -24938,7 +24946,7 @@
           <p:cNvPr id="5" name="Footer Placeholder 4">
             <a:extLst>
               <a:ext uri="{FF2B5EF4-FFF2-40B4-BE49-F238E27FC236}">
-                <a16:creationId xmlns:a16="http://schemas.microsoft.com/office/drawing/2014/main" id="{527A8496-2167-4D9D-A7F1-E07F56501D63}"/>
+                <a16:creationId xmlns:a16="http://schemas.microsoft.com/office/drawing/2014/main" xmlns="" id="{527A8496-2167-4D9D-A7F1-E07F56501D63}"/>
               </a:ext>
             </a:extLst>
           </p:cNvPr>
@@ -24995,7 +25003,7 @@
           <p:cNvPr id="6" name="Slide Number Placeholder 5">
             <a:extLst>
               <a:ext uri="{FF2B5EF4-FFF2-40B4-BE49-F238E27FC236}">
-                <a16:creationId xmlns:a16="http://schemas.microsoft.com/office/drawing/2014/main" id="{0D883F77-16A4-4D6A-864F-5E7655260333}"/>
+                <a16:creationId xmlns:a16="http://schemas.microsoft.com/office/drawing/2014/main" xmlns="" id="{0D883F77-16A4-4D6A-864F-5E7655260333}"/>
               </a:ext>
             </a:extLst>
           </p:cNvPr>
@@ -25025,7 +25033,7 @@
           <p:cNvPr id="14" name="Content Placeholder 13" descr="A close up of a map&#10;&#10;Description generated with very high confidence">
             <a:extLst>
               <a:ext uri="{FF2B5EF4-FFF2-40B4-BE49-F238E27FC236}">
-                <a16:creationId xmlns:a16="http://schemas.microsoft.com/office/drawing/2014/main" id="{68108ED2-CE41-4CF2-9B55-A91EEDDAB740}"/>
+                <a16:creationId xmlns:a16="http://schemas.microsoft.com/office/drawing/2014/main" xmlns="" id="{68108ED2-CE41-4CF2-9B55-A91EEDDAB740}"/>
               </a:ext>
             </a:extLst>
           </p:cNvPr>
@@ -25060,7 +25068,7 @@
           <p:cNvPr id="15" name="Title 1">
             <a:extLst>
               <a:ext uri="{FF2B5EF4-FFF2-40B4-BE49-F238E27FC236}">
-                <a16:creationId xmlns:a16="http://schemas.microsoft.com/office/drawing/2014/main" id="{D876B46F-79A6-44FA-B0B9-89AF6E35ECB6}"/>
+                <a16:creationId xmlns:a16="http://schemas.microsoft.com/office/drawing/2014/main" xmlns="" id="{D876B46F-79A6-44FA-B0B9-89AF6E35ECB6}"/>
               </a:ext>
             </a:extLst>
           </p:cNvPr>
@@ -25124,7 +25132,7 @@
           <p:cNvPr id="16" name="TextBox 15">
             <a:extLst>
               <a:ext uri="{FF2B5EF4-FFF2-40B4-BE49-F238E27FC236}">
-                <a16:creationId xmlns:a16="http://schemas.microsoft.com/office/drawing/2014/main" id="{ECDA6270-EC71-488D-8E5F-D6DB48795941}"/>
+                <a16:creationId xmlns:a16="http://schemas.microsoft.com/office/drawing/2014/main" xmlns="" id="{ECDA6270-EC71-488D-8E5F-D6DB48795941}"/>
               </a:ext>
             </a:extLst>
           </p:cNvPr>
@@ -25580,7 +25588,7 @@
           <p:cNvPr id="2" name="Title 1">
             <a:extLst>
               <a:ext uri="{FF2B5EF4-FFF2-40B4-BE49-F238E27FC236}">
-                <a16:creationId xmlns:a16="http://schemas.microsoft.com/office/drawing/2014/main" id="{E9494603-1C22-4A8B-96DB-3D42D3B82802}"/>
+                <a16:creationId xmlns:a16="http://schemas.microsoft.com/office/drawing/2014/main" xmlns="" id="{E9494603-1C22-4A8B-96DB-3D42D3B82802}"/>
               </a:ext>
             </a:extLst>
           </p:cNvPr>
@@ -25608,7 +25616,7 @@
           <p:cNvPr id="3" name="Content Placeholder 2">
             <a:extLst>
               <a:ext uri="{FF2B5EF4-FFF2-40B4-BE49-F238E27FC236}">
-                <a16:creationId xmlns:a16="http://schemas.microsoft.com/office/drawing/2014/main" id="{84F0F037-A703-4FE5-A20E-E873E5DCE356}"/>
+                <a16:creationId xmlns:a16="http://schemas.microsoft.com/office/drawing/2014/main" xmlns="" id="{84F0F037-A703-4FE5-A20E-E873E5DCE356}"/>
               </a:ext>
             </a:extLst>
           </p:cNvPr>
@@ -25869,7 +25877,7 @@
           <p:cNvPr id="4" name="Footer Placeholder 3">
             <a:extLst>
               <a:ext uri="{FF2B5EF4-FFF2-40B4-BE49-F238E27FC236}">
-                <a16:creationId xmlns:a16="http://schemas.microsoft.com/office/drawing/2014/main" id="{E1B43182-D327-45AA-BBE2-67B83983E1E7}"/>
+                <a16:creationId xmlns:a16="http://schemas.microsoft.com/office/drawing/2014/main" xmlns="" id="{E1B43182-D327-45AA-BBE2-67B83983E1E7}"/>
               </a:ext>
             </a:extLst>
           </p:cNvPr>
@@ -25926,7 +25934,7 @@
           <p:cNvPr id="5" name="Slide Number Placeholder 4">
             <a:extLst>
               <a:ext uri="{FF2B5EF4-FFF2-40B4-BE49-F238E27FC236}">
-                <a16:creationId xmlns:a16="http://schemas.microsoft.com/office/drawing/2014/main" id="{32AFE35B-758B-4A31-A289-5F105EBA2AAD}"/>
+                <a16:creationId xmlns:a16="http://schemas.microsoft.com/office/drawing/2014/main" xmlns="" id="{32AFE35B-758B-4A31-A289-5F105EBA2AAD}"/>
               </a:ext>
             </a:extLst>
           </p:cNvPr>
@@ -25986,7 +25994,7 @@
           <p:cNvPr id="2" name="Title 1">
             <a:extLst>
               <a:ext uri="{FF2B5EF4-FFF2-40B4-BE49-F238E27FC236}">
-                <a16:creationId xmlns:a16="http://schemas.microsoft.com/office/drawing/2014/main" id="{17A8BB3D-2D35-4F66-AFB4-2A9AE7681862}"/>
+                <a16:creationId xmlns:a16="http://schemas.microsoft.com/office/drawing/2014/main" xmlns="" id="{17A8BB3D-2D35-4F66-AFB4-2A9AE7681862}"/>
               </a:ext>
             </a:extLst>
           </p:cNvPr>
@@ -26020,7 +26028,7 @@
           <p:cNvPr id="3" name="Footer Placeholder 2">
             <a:extLst>
               <a:ext uri="{FF2B5EF4-FFF2-40B4-BE49-F238E27FC236}">
-                <a16:creationId xmlns:a16="http://schemas.microsoft.com/office/drawing/2014/main" id="{11862E8A-91FD-4C41-A192-DB3D27D88824}"/>
+                <a16:creationId xmlns:a16="http://schemas.microsoft.com/office/drawing/2014/main" xmlns="" id="{11862E8A-91FD-4C41-A192-DB3D27D88824}"/>
               </a:ext>
             </a:extLst>
           </p:cNvPr>
@@ -26077,7 +26085,7 @@
           <p:cNvPr id="4" name="Slide Number Placeholder 3">
             <a:extLst>
               <a:ext uri="{FF2B5EF4-FFF2-40B4-BE49-F238E27FC236}">
-                <a16:creationId xmlns:a16="http://schemas.microsoft.com/office/drawing/2014/main" id="{9DA5ED20-07EE-4130-97A2-FC2FBDDF57B9}"/>
+                <a16:creationId xmlns:a16="http://schemas.microsoft.com/office/drawing/2014/main" xmlns="" id="{9DA5ED20-07EE-4130-97A2-FC2FBDDF57B9}"/>
               </a:ext>
             </a:extLst>
           </p:cNvPr>
@@ -26234,7 +26242,7 @@
           <p:cNvPr id="10" name="Content Placeholder 9" descr="A picture containing writing implement, stationary, pencil&#10;&#10;Description generated with very high confidence">
             <a:extLst>
               <a:ext uri="{FF2B5EF4-FFF2-40B4-BE49-F238E27FC236}">
-                <a16:creationId xmlns:a16="http://schemas.microsoft.com/office/drawing/2014/main" id="{6A2279EC-6199-4550-A04B-49AEC7FAB4A2}"/>
+                <a16:creationId xmlns:a16="http://schemas.microsoft.com/office/drawing/2014/main" xmlns="" id="{6A2279EC-6199-4550-A04B-49AEC7FAB4A2}"/>
               </a:ext>
             </a:extLst>
           </p:cNvPr>
@@ -26269,7 +26277,7 @@
           <p:cNvPr id="14" name="Content Placeholder 13" descr="A picture containing stationary&#10;&#10;Description generated with high confidence">
             <a:extLst>
               <a:ext uri="{FF2B5EF4-FFF2-40B4-BE49-F238E27FC236}">
-                <a16:creationId xmlns:a16="http://schemas.microsoft.com/office/drawing/2014/main" id="{81819DC7-CA2F-4965-A125-662C3B79A4F5}"/>
+                <a16:creationId xmlns:a16="http://schemas.microsoft.com/office/drawing/2014/main" xmlns="" id="{81819DC7-CA2F-4965-A125-662C3B79A4F5}"/>
               </a:ext>
             </a:extLst>
           </p:cNvPr>
@@ -26306,7 +26314,7 @@
               <p:cNvPr id="7" name="TextBox 6">
                 <a:extLst>
                   <a:ext uri="{FF2B5EF4-FFF2-40B4-BE49-F238E27FC236}">
-                    <a16:creationId xmlns:a16="http://schemas.microsoft.com/office/drawing/2014/main" id="{29E2EA99-4EA3-4FA6-A203-F59B82BB3CC4}"/>
+                    <a16:creationId xmlns:a16="http://schemas.microsoft.com/office/drawing/2014/main" xmlns="" id="{29E2EA99-4EA3-4FA6-A203-F59B82BB3CC4}"/>
                   </a:ext>
                 </a:extLst>
               </p:cNvPr>
@@ -26420,7 +26428,7 @@
           <p:cNvPr id="8" name="TextBox 7">
             <a:extLst>
               <a:ext uri="{FF2B5EF4-FFF2-40B4-BE49-F238E27FC236}">
-                <a16:creationId xmlns:a16="http://schemas.microsoft.com/office/drawing/2014/main" id="{3F71761C-517A-47EB-9DAD-CD5B55CE25E6}"/>
+                <a16:creationId xmlns:a16="http://schemas.microsoft.com/office/drawing/2014/main" xmlns="" id="{3F71761C-517A-47EB-9DAD-CD5B55CE25E6}"/>
               </a:ext>
             </a:extLst>
           </p:cNvPr>
@@ -26773,7 +26781,7 @@
           <p:cNvPr id="9" name="Content Placeholder 8" descr="A close up of a map&#10;&#10;Description generated with very high confidence">
             <a:extLst>
               <a:ext uri="{FF2B5EF4-FFF2-40B4-BE49-F238E27FC236}">
-                <a16:creationId xmlns:a16="http://schemas.microsoft.com/office/drawing/2014/main" id="{E778F286-CFBD-4176-AB1C-36E819F1257E}"/>
+                <a16:creationId xmlns:a16="http://schemas.microsoft.com/office/drawing/2014/main" xmlns="" id="{E778F286-CFBD-4176-AB1C-36E819F1257E}"/>
               </a:ext>
             </a:extLst>
           </p:cNvPr>
@@ -26808,7 +26816,7 @@
           <p:cNvPr id="11" name="TextBox 10">
             <a:extLst>
               <a:ext uri="{FF2B5EF4-FFF2-40B4-BE49-F238E27FC236}">
-                <a16:creationId xmlns:a16="http://schemas.microsoft.com/office/drawing/2014/main" id="{B84D3093-F089-4E18-A02C-1D06303D0AEA}"/>
+                <a16:creationId xmlns:a16="http://schemas.microsoft.com/office/drawing/2014/main" xmlns="" id="{B84D3093-F089-4E18-A02C-1D06303D0AEA}"/>
               </a:ext>
             </a:extLst>
           </p:cNvPr>
@@ -27265,7 +27273,7 @@
           <p:cNvPr id="2" name="Title 1">
             <a:extLst>
               <a:ext uri="{FF2B5EF4-FFF2-40B4-BE49-F238E27FC236}">
-                <a16:creationId xmlns:a16="http://schemas.microsoft.com/office/drawing/2014/main" id="{E9494603-1C22-4A8B-96DB-3D42D3B82802}"/>
+                <a16:creationId xmlns:a16="http://schemas.microsoft.com/office/drawing/2014/main" xmlns="" id="{E9494603-1C22-4A8B-96DB-3D42D3B82802}"/>
               </a:ext>
             </a:extLst>
           </p:cNvPr>
@@ -27293,7 +27301,7 @@
           <p:cNvPr id="3" name="Content Placeholder 2">
             <a:extLst>
               <a:ext uri="{FF2B5EF4-FFF2-40B4-BE49-F238E27FC236}">
-                <a16:creationId xmlns:a16="http://schemas.microsoft.com/office/drawing/2014/main" id="{84F0F037-A703-4FE5-A20E-E873E5DCE356}"/>
+                <a16:creationId xmlns:a16="http://schemas.microsoft.com/office/drawing/2014/main" xmlns="" id="{84F0F037-A703-4FE5-A20E-E873E5DCE356}"/>
               </a:ext>
             </a:extLst>
           </p:cNvPr>
@@ -27554,7 +27562,7 @@
           <p:cNvPr id="4" name="Footer Placeholder 3">
             <a:extLst>
               <a:ext uri="{FF2B5EF4-FFF2-40B4-BE49-F238E27FC236}">
-                <a16:creationId xmlns:a16="http://schemas.microsoft.com/office/drawing/2014/main" id="{E1B43182-D327-45AA-BBE2-67B83983E1E7}"/>
+                <a16:creationId xmlns:a16="http://schemas.microsoft.com/office/drawing/2014/main" xmlns="" id="{E1B43182-D327-45AA-BBE2-67B83983E1E7}"/>
               </a:ext>
             </a:extLst>
           </p:cNvPr>
@@ -27611,7 +27619,7 @@
           <p:cNvPr id="5" name="Slide Number Placeholder 4">
             <a:extLst>
               <a:ext uri="{FF2B5EF4-FFF2-40B4-BE49-F238E27FC236}">
-                <a16:creationId xmlns:a16="http://schemas.microsoft.com/office/drawing/2014/main" id="{32AFE35B-758B-4A31-A289-5F105EBA2AAD}"/>
+                <a16:creationId xmlns:a16="http://schemas.microsoft.com/office/drawing/2014/main" xmlns="" id="{32AFE35B-758B-4A31-A289-5F105EBA2AAD}"/>
               </a:ext>
             </a:extLst>
           </p:cNvPr>
@@ -27671,7 +27679,7 @@
           <p:cNvPr id="2" name="Title 1">
             <a:extLst>
               <a:ext uri="{FF2B5EF4-FFF2-40B4-BE49-F238E27FC236}">
-                <a16:creationId xmlns:a16="http://schemas.microsoft.com/office/drawing/2014/main" id="{095F985D-3AA4-4815-97D5-8FFAD0B4ABEC}"/>
+                <a16:creationId xmlns:a16="http://schemas.microsoft.com/office/drawing/2014/main" xmlns="" id="{095F985D-3AA4-4815-97D5-8FFAD0B4ABEC}"/>
               </a:ext>
             </a:extLst>
           </p:cNvPr>
@@ -27699,7 +27707,7 @@
           <p:cNvPr id="7" name="Content Placeholder 6" descr="A picture containing screenshot&#10;&#10;Description generated with very high confidence">
             <a:extLst>
               <a:ext uri="{FF2B5EF4-FFF2-40B4-BE49-F238E27FC236}">
-                <a16:creationId xmlns:a16="http://schemas.microsoft.com/office/drawing/2014/main" id="{4B532FB5-3148-444B-AC79-34404074FC4E}"/>
+                <a16:creationId xmlns:a16="http://schemas.microsoft.com/office/drawing/2014/main" xmlns="" id="{4B532FB5-3148-444B-AC79-34404074FC4E}"/>
               </a:ext>
             </a:extLst>
           </p:cNvPr>
@@ -27734,7 +27742,7 @@
           <p:cNvPr id="4" name="Footer Placeholder 3">
             <a:extLst>
               <a:ext uri="{FF2B5EF4-FFF2-40B4-BE49-F238E27FC236}">
-                <a16:creationId xmlns:a16="http://schemas.microsoft.com/office/drawing/2014/main" id="{0C933173-7F0A-4A6D-AD21-37FC450395B8}"/>
+                <a16:creationId xmlns:a16="http://schemas.microsoft.com/office/drawing/2014/main" xmlns="" id="{0C933173-7F0A-4A6D-AD21-37FC450395B8}"/>
               </a:ext>
             </a:extLst>
           </p:cNvPr>
@@ -27791,7 +27799,7 @@
           <p:cNvPr id="5" name="Slide Number Placeholder 4">
             <a:extLst>
               <a:ext uri="{FF2B5EF4-FFF2-40B4-BE49-F238E27FC236}">
-                <a16:creationId xmlns:a16="http://schemas.microsoft.com/office/drawing/2014/main" id="{E31208DF-6244-4DA5-8048-3BEAA7768E2E}"/>
+                <a16:creationId xmlns:a16="http://schemas.microsoft.com/office/drawing/2014/main" xmlns="" id="{E31208DF-6244-4DA5-8048-3BEAA7768E2E}"/>
               </a:ext>
             </a:extLst>
           </p:cNvPr>
@@ -27823,7 +27831,7 @@
               <p:cNvPr id="6" name="TextBox 5">
                 <a:extLst>
                   <a:ext uri="{FF2B5EF4-FFF2-40B4-BE49-F238E27FC236}">
-                    <a16:creationId xmlns:a16="http://schemas.microsoft.com/office/drawing/2014/main" id="{738E71BF-8253-40FA-9FD5-8C483ADF4613}"/>
+                    <a16:creationId xmlns:a16="http://schemas.microsoft.com/office/drawing/2014/main" xmlns="" id="{738E71BF-8253-40FA-9FD5-8C483ADF4613}"/>
                   </a:ext>
                 </a:extLst>
               </p:cNvPr>
@@ -28053,7 +28061,7 @@
           <p:cNvPr id="2" name="Title 1">
             <a:extLst>
               <a:ext uri="{FF2B5EF4-FFF2-40B4-BE49-F238E27FC236}">
-                <a16:creationId xmlns:a16="http://schemas.microsoft.com/office/drawing/2014/main" id="{5CE6485A-8069-4667-8F25-BD25E6775096}"/>
+                <a16:creationId xmlns:a16="http://schemas.microsoft.com/office/drawing/2014/main" xmlns="" id="{5CE6485A-8069-4667-8F25-BD25E6775096}"/>
               </a:ext>
             </a:extLst>
           </p:cNvPr>
@@ -28081,7 +28089,7 @@
           <p:cNvPr id="7" name="Content Placeholder 6" descr="A picture containing screenshot&#10;&#10;Description generated with very high confidence">
             <a:extLst>
               <a:ext uri="{FF2B5EF4-FFF2-40B4-BE49-F238E27FC236}">
-                <a16:creationId xmlns:a16="http://schemas.microsoft.com/office/drawing/2014/main" id="{577919D3-17BE-4A67-B79B-9CD313D0AAD6}"/>
+                <a16:creationId xmlns:a16="http://schemas.microsoft.com/office/drawing/2014/main" xmlns="" id="{577919D3-17BE-4A67-B79B-9CD313D0AAD6}"/>
               </a:ext>
             </a:extLst>
           </p:cNvPr>
@@ -28116,7 +28124,7 @@
           <p:cNvPr id="4" name="Footer Placeholder 3">
             <a:extLst>
               <a:ext uri="{FF2B5EF4-FFF2-40B4-BE49-F238E27FC236}">
-                <a16:creationId xmlns:a16="http://schemas.microsoft.com/office/drawing/2014/main" id="{D7794539-2014-4F0D-8ACA-BE854275BB6C}"/>
+                <a16:creationId xmlns:a16="http://schemas.microsoft.com/office/drawing/2014/main" xmlns="" id="{D7794539-2014-4F0D-8ACA-BE854275BB6C}"/>
               </a:ext>
             </a:extLst>
           </p:cNvPr>
@@ -28173,7 +28181,7 @@
           <p:cNvPr id="5" name="Slide Number Placeholder 4">
             <a:extLst>
               <a:ext uri="{FF2B5EF4-FFF2-40B4-BE49-F238E27FC236}">
-                <a16:creationId xmlns:a16="http://schemas.microsoft.com/office/drawing/2014/main" id="{B14CF67A-4C0D-42E8-8422-A0EC36F55E5D}"/>
+                <a16:creationId xmlns:a16="http://schemas.microsoft.com/office/drawing/2014/main" xmlns="" id="{B14CF67A-4C0D-42E8-8422-A0EC36F55E5D}"/>
               </a:ext>
             </a:extLst>
           </p:cNvPr>
@@ -28203,7 +28211,7 @@
           <p:cNvPr id="8" name="TextBox 7">
             <a:extLst>
               <a:ext uri="{FF2B5EF4-FFF2-40B4-BE49-F238E27FC236}">
-                <a16:creationId xmlns:a16="http://schemas.microsoft.com/office/drawing/2014/main" id="{750E3A72-6DAB-49D2-BC00-5C345BFA13E3}"/>
+                <a16:creationId xmlns:a16="http://schemas.microsoft.com/office/drawing/2014/main" xmlns="" id="{750E3A72-6DAB-49D2-BC00-5C345BFA13E3}"/>
               </a:ext>
             </a:extLst>
           </p:cNvPr>
@@ -28451,7 +28459,7 @@
           <p:cNvPr id="15" name="Content Placeholder 14" descr="A close up of a map&#10;&#10;Description generated with very high confidence">
             <a:extLst>
               <a:ext uri="{FF2B5EF4-FFF2-40B4-BE49-F238E27FC236}">
-                <a16:creationId xmlns:a16="http://schemas.microsoft.com/office/drawing/2014/main" id="{C42A599A-433A-4488-AD6E-322AC6356A13}"/>
+                <a16:creationId xmlns:a16="http://schemas.microsoft.com/office/drawing/2014/main" xmlns="" id="{C42A599A-433A-4488-AD6E-322AC6356A13}"/>
               </a:ext>
             </a:extLst>
           </p:cNvPr>
@@ -28486,7 +28494,7 @@
           <p:cNvPr id="16" name="TextBox 15">
             <a:extLst>
               <a:ext uri="{FF2B5EF4-FFF2-40B4-BE49-F238E27FC236}">
-                <a16:creationId xmlns:a16="http://schemas.microsoft.com/office/drawing/2014/main" id="{75334F2B-2C9C-4C17-909D-FE129119752B}"/>
+                <a16:creationId xmlns:a16="http://schemas.microsoft.com/office/drawing/2014/main" xmlns="" id="{75334F2B-2C9C-4C17-909D-FE129119752B}"/>
               </a:ext>
             </a:extLst>
           </p:cNvPr>
@@ -28637,7 +28645,7 @@
           <p:cNvPr id="2" name="Title 1">
             <a:extLst>
               <a:ext uri="{FF2B5EF4-FFF2-40B4-BE49-F238E27FC236}">
-                <a16:creationId xmlns:a16="http://schemas.microsoft.com/office/drawing/2014/main" id="{E9494603-1C22-4A8B-96DB-3D42D3B82802}"/>
+                <a16:creationId xmlns:a16="http://schemas.microsoft.com/office/drawing/2014/main" xmlns="" id="{E9494603-1C22-4A8B-96DB-3D42D3B82802}"/>
               </a:ext>
             </a:extLst>
           </p:cNvPr>
@@ -28665,7 +28673,7 @@
           <p:cNvPr id="3" name="Content Placeholder 2">
             <a:extLst>
               <a:ext uri="{FF2B5EF4-FFF2-40B4-BE49-F238E27FC236}">
-                <a16:creationId xmlns:a16="http://schemas.microsoft.com/office/drawing/2014/main" id="{84F0F037-A703-4FE5-A20E-E873E5DCE356}"/>
+                <a16:creationId xmlns:a16="http://schemas.microsoft.com/office/drawing/2014/main" xmlns="" id="{84F0F037-A703-4FE5-A20E-E873E5DCE356}"/>
               </a:ext>
             </a:extLst>
           </p:cNvPr>
@@ -28926,7 +28934,7 @@
           <p:cNvPr id="4" name="Footer Placeholder 3">
             <a:extLst>
               <a:ext uri="{FF2B5EF4-FFF2-40B4-BE49-F238E27FC236}">
-                <a16:creationId xmlns:a16="http://schemas.microsoft.com/office/drawing/2014/main" id="{E1B43182-D327-45AA-BBE2-67B83983E1E7}"/>
+                <a16:creationId xmlns:a16="http://schemas.microsoft.com/office/drawing/2014/main" xmlns="" id="{E1B43182-D327-45AA-BBE2-67B83983E1E7}"/>
               </a:ext>
             </a:extLst>
           </p:cNvPr>
@@ -28983,7 +28991,7 @@
           <p:cNvPr id="5" name="Slide Number Placeholder 4">
             <a:extLst>
               <a:ext uri="{FF2B5EF4-FFF2-40B4-BE49-F238E27FC236}">
-                <a16:creationId xmlns:a16="http://schemas.microsoft.com/office/drawing/2014/main" id="{32AFE35B-758B-4A31-A289-5F105EBA2AAD}"/>
+                <a16:creationId xmlns:a16="http://schemas.microsoft.com/office/drawing/2014/main" xmlns="" id="{32AFE35B-758B-4A31-A289-5F105EBA2AAD}"/>
               </a:ext>
             </a:extLst>
           </p:cNvPr>
@@ -29043,7 +29051,7 @@
           <p:cNvPr id="2" name="Title 1">
             <a:extLst>
               <a:ext uri="{FF2B5EF4-FFF2-40B4-BE49-F238E27FC236}">
-                <a16:creationId xmlns:a16="http://schemas.microsoft.com/office/drawing/2014/main" id="{AC6F5310-011B-4009-94E8-352B168BCBFC}"/>
+                <a16:creationId xmlns:a16="http://schemas.microsoft.com/office/drawing/2014/main" xmlns="" id="{AC6F5310-011B-4009-94E8-352B168BCBFC}"/>
               </a:ext>
             </a:extLst>
           </p:cNvPr>
@@ -29071,7 +29079,7 @@
           <p:cNvPr id="8" name="Content Placeholder 7" descr="A picture containing screenshot&#10;&#10;Description generated with very high confidence">
             <a:extLst>
               <a:ext uri="{FF2B5EF4-FFF2-40B4-BE49-F238E27FC236}">
-                <a16:creationId xmlns:a16="http://schemas.microsoft.com/office/drawing/2014/main" id="{D58C44BD-1178-4B33-8E41-5C4F08E7731D}"/>
+                <a16:creationId xmlns:a16="http://schemas.microsoft.com/office/drawing/2014/main" xmlns="" id="{D58C44BD-1178-4B33-8E41-5C4F08E7731D}"/>
               </a:ext>
             </a:extLst>
           </p:cNvPr>
@@ -29106,7 +29114,7 @@
           <p:cNvPr id="10" name="Content Placeholder 9" descr="A picture containing screenshot&#10;&#10;Description generated with very high confidence">
             <a:extLst>
               <a:ext uri="{FF2B5EF4-FFF2-40B4-BE49-F238E27FC236}">
-                <a16:creationId xmlns:a16="http://schemas.microsoft.com/office/drawing/2014/main" id="{DA72824A-C3FD-4FEA-80BA-B1232E809B19}"/>
+                <a16:creationId xmlns:a16="http://schemas.microsoft.com/office/drawing/2014/main" xmlns="" id="{DA72824A-C3FD-4FEA-80BA-B1232E809B19}"/>
               </a:ext>
             </a:extLst>
           </p:cNvPr>
@@ -29141,7 +29149,7 @@
           <p:cNvPr id="5" name="Footer Placeholder 4">
             <a:extLst>
               <a:ext uri="{FF2B5EF4-FFF2-40B4-BE49-F238E27FC236}">
-                <a16:creationId xmlns:a16="http://schemas.microsoft.com/office/drawing/2014/main" id="{06EEE054-49DD-41B0-A6B3-9D83BB88D0C7}"/>
+                <a16:creationId xmlns:a16="http://schemas.microsoft.com/office/drawing/2014/main" xmlns="" id="{06EEE054-49DD-41B0-A6B3-9D83BB88D0C7}"/>
               </a:ext>
             </a:extLst>
           </p:cNvPr>
@@ -29198,7 +29206,7 @@
           <p:cNvPr id="6" name="Slide Number Placeholder 5">
             <a:extLst>
               <a:ext uri="{FF2B5EF4-FFF2-40B4-BE49-F238E27FC236}">
-                <a16:creationId xmlns:a16="http://schemas.microsoft.com/office/drawing/2014/main" id="{464AE381-8CCB-46D5-98E3-44C23DFF523E}"/>
+                <a16:creationId xmlns:a16="http://schemas.microsoft.com/office/drawing/2014/main" xmlns="" id="{464AE381-8CCB-46D5-98E3-44C23DFF523E}"/>
               </a:ext>
             </a:extLst>
           </p:cNvPr>
@@ -29228,7 +29236,7 @@
           <p:cNvPr id="7" name="TextBox 6">
             <a:extLst>
               <a:ext uri="{FF2B5EF4-FFF2-40B4-BE49-F238E27FC236}">
-                <a16:creationId xmlns:a16="http://schemas.microsoft.com/office/drawing/2014/main" id="{5819F12B-E413-4B31-9EF5-E9F6AA1DDCE9}"/>
+                <a16:creationId xmlns:a16="http://schemas.microsoft.com/office/drawing/2014/main" xmlns="" id="{5819F12B-E413-4B31-9EF5-E9F6AA1DDCE9}"/>
               </a:ext>
             </a:extLst>
           </p:cNvPr>
@@ -29263,7 +29271,7 @@
           <p:cNvPr id="9" name="TextBox 8">
             <a:extLst>
               <a:ext uri="{FF2B5EF4-FFF2-40B4-BE49-F238E27FC236}">
-                <a16:creationId xmlns:a16="http://schemas.microsoft.com/office/drawing/2014/main" id="{7E068977-C6F8-425A-9843-30F24086AC98}"/>
+                <a16:creationId xmlns:a16="http://schemas.microsoft.com/office/drawing/2014/main" xmlns="" id="{7E068977-C6F8-425A-9843-30F24086AC98}"/>
               </a:ext>
             </a:extLst>
           </p:cNvPr>
@@ -29468,7 +29476,7 @@
           <p:cNvPr id="2" name="Title 1">
             <a:extLst>
               <a:ext uri="{FF2B5EF4-FFF2-40B4-BE49-F238E27FC236}">
-                <a16:creationId xmlns:a16="http://schemas.microsoft.com/office/drawing/2014/main" id="{E9494603-1C22-4A8B-96DB-3D42D3B82802}"/>
+                <a16:creationId xmlns:a16="http://schemas.microsoft.com/office/drawing/2014/main" xmlns="" id="{E9494603-1C22-4A8B-96DB-3D42D3B82802}"/>
               </a:ext>
             </a:extLst>
           </p:cNvPr>
@@ -29496,7 +29504,7 @@
           <p:cNvPr id="3" name="Content Placeholder 2">
             <a:extLst>
               <a:ext uri="{FF2B5EF4-FFF2-40B4-BE49-F238E27FC236}">
-                <a16:creationId xmlns:a16="http://schemas.microsoft.com/office/drawing/2014/main" id="{84F0F037-A703-4FE5-A20E-E873E5DCE356}"/>
+                <a16:creationId xmlns:a16="http://schemas.microsoft.com/office/drawing/2014/main" xmlns="" id="{84F0F037-A703-4FE5-A20E-E873E5DCE356}"/>
               </a:ext>
             </a:extLst>
           </p:cNvPr>
@@ -29657,7 +29665,7 @@
           <p:cNvPr id="4" name="Footer Placeholder 3">
             <a:extLst>
               <a:ext uri="{FF2B5EF4-FFF2-40B4-BE49-F238E27FC236}">
-                <a16:creationId xmlns:a16="http://schemas.microsoft.com/office/drawing/2014/main" id="{E1B43182-D327-45AA-BBE2-67B83983E1E7}"/>
+                <a16:creationId xmlns:a16="http://schemas.microsoft.com/office/drawing/2014/main" xmlns="" id="{E1B43182-D327-45AA-BBE2-67B83983E1E7}"/>
               </a:ext>
             </a:extLst>
           </p:cNvPr>
@@ -29714,7 +29722,7 @@
           <p:cNvPr id="5" name="Slide Number Placeholder 4">
             <a:extLst>
               <a:ext uri="{FF2B5EF4-FFF2-40B4-BE49-F238E27FC236}">
-                <a16:creationId xmlns:a16="http://schemas.microsoft.com/office/drawing/2014/main" id="{32AFE35B-758B-4A31-A289-5F105EBA2AAD}"/>
+                <a16:creationId xmlns:a16="http://schemas.microsoft.com/office/drawing/2014/main" xmlns="" id="{32AFE35B-758B-4A31-A289-5F105EBA2AAD}"/>
               </a:ext>
             </a:extLst>
           </p:cNvPr>
@@ -30062,7 +30070,7 @@
           <p:cNvPr id="27" name="Picture 26">
             <a:extLst>
               <a:ext uri="{FF2B5EF4-FFF2-40B4-BE49-F238E27FC236}">
-                <a16:creationId xmlns:a16="http://schemas.microsoft.com/office/drawing/2014/main" id="{603D7664-7969-40A7-A2CA-66AF18DCCA66}"/>
+                <a16:creationId xmlns:a16="http://schemas.microsoft.com/office/drawing/2014/main" xmlns="" id="{603D7664-7969-40A7-A2CA-66AF18DCCA66}"/>
               </a:ext>
             </a:extLst>
           </p:cNvPr>
@@ -30098,7 +30106,7 @@
           <p:cNvPr id="29" name="Picture 28" descr="A picture containing sky&#10;&#10;Description generated with high confidence">
             <a:extLst>
               <a:ext uri="{FF2B5EF4-FFF2-40B4-BE49-F238E27FC236}">
-                <a16:creationId xmlns:a16="http://schemas.microsoft.com/office/drawing/2014/main" id="{236E797F-9D1D-43B1-B27C-ED9F80B6FE99}"/>
+                <a16:creationId xmlns:a16="http://schemas.microsoft.com/office/drawing/2014/main" xmlns="" id="{236E797F-9D1D-43B1-B27C-ED9F80B6FE99}"/>
               </a:ext>
             </a:extLst>
           </p:cNvPr>
@@ -30134,7 +30142,7 @@
           <p:cNvPr id="31" name="Picture 30">
             <a:extLst>
               <a:ext uri="{FF2B5EF4-FFF2-40B4-BE49-F238E27FC236}">
-                <a16:creationId xmlns:a16="http://schemas.microsoft.com/office/drawing/2014/main" id="{C7376AA4-DC75-4ADE-AD3F-F55381E32CD9}"/>
+                <a16:creationId xmlns:a16="http://schemas.microsoft.com/office/drawing/2014/main" xmlns="" id="{C7376AA4-DC75-4ADE-AD3F-F55381E32CD9}"/>
               </a:ext>
             </a:extLst>
           </p:cNvPr>
@@ -30170,7 +30178,7 @@
           <p:cNvPr id="33" name="Picture 32" descr="A close up of a light&#10;&#10;Description generated with high confidence">
             <a:extLst>
               <a:ext uri="{FF2B5EF4-FFF2-40B4-BE49-F238E27FC236}">
-                <a16:creationId xmlns:a16="http://schemas.microsoft.com/office/drawing/2014/main" id="{04867F30-F0D7-4BBC-BCDA-50F5C2FBC8C9}"/>
+                <a16:creationId xmlns:a16="http://schemas.microsoft.com/office/drawing/2014/main" xmlns="" id="{04867F30-F0D7-4BBC-BCDA-50F5C2FBC8C9}"/>
               </a:ext>
             </a:extLst>
           </p:cNvPr>
@@ -30206,7 +30214,7 @@
           <p:cNvPr id="34" name="Content Placeholder 12" descr="A screenshot of a cell phone&#10;&#10;Description generated with very high confidence">
             <a:extLst>
               <a:ext uri="{FF2B5EF4-FFF2-40B4-BE49-F238E27FC236}">
-                <a16:creationId xmlns:a16="http://schemas.microsoft.com/office/drawing/2014/main" id="{06803ADF-AE0F-439B-9A5F-9E311C94D3EF}"/>
+                <a16:creationId xmlns:a16="http://schemas.microsoft.com/office/drawing/2014/main" xmlns="" id="{06803ADF-AE0F-439B-9A5F-9E311C94D3EF}"/>
               </a:ext>
             </a:extLst>
           </p:cNvPr>
@@ -31107,7 +31115,7 @@
           <p:cNvPr id="5" name="Footer Placeholder 4">
             <a:extLst>
               <a:ext uri="{FF2B5EF4-FFF2-40B4-BE49-F238E27FC236}">
-                <a16:creationId xmlns:a16="http://schemas.microsoft.com/office/drawing/2014/main" id="{6AC7966E-6694-4F89-AFC2-98BF0D06DAE2}"/>
+                <a16:creationId xmlns:a16="http://schemas.microsoft.com/office/drawing/2014/main" xmlns="" id="{6AC7966E-6694-4F89-AFC2-98BF0D06DAE2}"/>
               </a:ext>
             </a:extLst>
           </p:cNvPr>
@@ -31164,7 +31172,7 @@
           <p:cNvPr id="6" name="Slide Number Placeholder 5">
             <a:extLst>
               <a:ext uri="{FF2B5EF4-FFF2-40B4-BE49-F238E27FC236}">
-                <a16:creationId xmlns:a16="http://schemas.microsoft.com/office/drawing/2014/main" id="{75DC981C-CDAE-479D-AC14-3CE4B7209D43}"/>
+                <a16:creationId xmlns:a16="http://schemas.microsoft.com/office/drawing/2014/main" xmlns="" id="{75DC981C-CDAE-479D-AC14-3CE4B7209D43}"/>
               </a:ext>
             </a:extLst>
           </p:cNvPr>
@@ -31194,7 +31202,7 @@
           <p:cNvPr id="10" name="Rectangle 9">
             <a:extLst>
               <a:ext uri="{FF2B5EF4-FFF2-40B4-BE49-F238E27FC236}">
-                <a16:creationId xmlns:a16="http://schemas.microsoft.com/office/drawing/2014/main" id="{A94EB12A-E96E-4462-81D8-1E932FFBDDD4}"/>
+                <a16:creationId xmlns:a16="http://schemas.microsoft.com/office/drawing/2014/main" xmlns="" id="{A94EB12A-E96E-4462-81D8-1E932FFBDDD4}"/>
               </a:ext>
             </a:extLst>
           </p:cNvPr>
@@ -31246,7 +31254,7 @@
           <p:cNvPr id="17" name="Rectangle 16">
             <a:extLst>
               <a:ext uri="{FF2B5EF4-FFF2-40B4-BE49-F238E27FC236}">
-                <a16:creationId xmlns:a16="http://schemas.microsoft.com/office/drawing/2014/main" id="{1075960E-DBDE-45DA-AABF-71B555799A01}"/>
+                <a16:creationId xmlns:a16="http://schemas.microsoft.com/office/drawing/2014/main" xmlns="" id="{1075960E-DBDE-45DA-AABF-71B555799A01}"/>
               </a:ext>
             </a:extLst>
           </p:cNvPr>
@@ -31298,7 +31306,7 @@
           <p:cNvPr id="18" name="Rectangle 17">
             <a:extLst>
               <a:ext uri="{FF2B5EF4-FFF2-40B4-BE49-F238E27FC236}">
-                <a16:creationId xmlns:a16="http://schemas.microsoft.com/office/drawing/2014/main" id="{7063C499-4A50-4CB9-ABCA-40D4351CCDC1}"/>
+                <a16:creationId xmlns:a16="http://schemas.microsoft.com/office/drawing/2014/main" xmlns="" id="{7063C499-4A50-4CB9-ABCA-40D4351CCDC1}"/>
               </a:ext>
             </a:extLst>
           </p:cNvPr>
@@ -31350,7 +31358,7 @@
           <p:cNvPr id="19" name="Rectangle 18">
             <a:extLst>
               <a:ext uri="{FF2B5EF4-FFF2-40B4-BE49-F238E27FC236}">
-                <a16:creationId xmlns:a16="http://schemas.microsoft.com/office/drawing/2014/main" id="{DA2542BB-265D-40EA-B38F-B6F4D21B484C}"/>
+                <a16:creationId xmlns:a16="http://schemas.microsoft.com/office/drawing/2014/main" xmlns="" id="{DA2542BB-265D-40EA-B38F-B6F4D21B484C}"/>
               </a:ext>
             </a:extLst>
           </p:cNvPr>
@@ -31402,7 +31410,7 @@
           <p:cNvPr id="13" name="Content Placeholder 12" descr="A screenshot of a cell phone&#10;&#10;Description generated with very high confidence">
             <a:extLst>
               <a:ext uri="{FF2B5EF4-FFF2-40B4-BE49-F238E27FC236}">
-                <a16:creationId xmlns:a16="http://schemas.microsoft.com/office/drawing/2014/main" id="{215C2784-355B-43BC-80D7-C2A806ACB37F}"/>
+                <a16:creationId xmlns:a16="http://schemas.microsoft.com/office/drawing/2014/main" xmlns="" id="{215C2784-355B-43BC-80D7-C2A806ACB37F}"/>
               </a:ext>
             </a:extLst>
           </p:cNvPr>
@@ -31437,7 +31445,7 @@
           <p:cNvPr id="21" name="Picture 20" descr="A close up of an animal&#10;&#10;Description generated with high confidence">
             <a:extLst>
               <a:ext uri="{FF2B5EF4-FFF2-40B4-BE49-F238E27FC236}">
-                <a16:creationId xmlns:a16="http://schemas.microsoft.com/office/drawing/2014/main" id="{DA6D2CC4-11E9-42A9-8EC9-7404781F73C8}"/>
+                <a16:creationId xmlns:a16="http://schemas.microsoft.com/office/drawing/2014/main" xmlns="" id="{DA6D2CC4-11E9-42A9-8EC9-7404781F73C8}"/>
               </a:ext>
             </a:extLst>
           </p:cNvPr>
@@ -31473,7 +31481,7 @@
           <p:cNvPr id="23" name="Picture 22">
             <a:extLst>
               <a:ext uri="{FF2B5EF4-FFF2-40B4-BE49-F238E27FC236}">
-                <a16:creationId xmlns:a16="http://schemas.microsoft.com/office/drawing/2014/main" id="{760679DF-CC0E-4830-8A5F-F5C0ED4FF802}"/>
+                <a16:creationId xmlns:a16="http://schemas.microsoft.com/office/drawing/2014/main" xmlns="" id="{760679DF-CC0E-4830-8A5F-F5C0ED4FF802}"/>
               </a:ext>
             </a:extLst>
           </p:cNvPr>
@@ -31509,7 +31517,7 @@
           <p:cNvPr id="25" name="Picture 24" descr="A picture containing sky&#10;&#10;Description generated with high confidence">
             <a:extLst>
               <a:ext uri="{FF2B5EF4-FFF2-40B4-BE49-F238E27FC236}">
-                <a16:creationId xmlns:a16="http://schemas.microsoft.com/office/drawing/2014/main" id="{A8914C22-712A-4768-B264-A842A74A0109}"/>
+                <a16:creationId xmlns:a16="http://schemas.microsoft.com/office/drawing/2014/main" xmlns="" id="{A8914C22-712A-4768-B264-A842A74A0109}"/>
               </a:ext>
             </a:extLst>
           </p:cNvPr>
@@ -31545,7 +31553,7 @@
           <p:cNvPr id="27" name="Picture 26">
             <a:extLst>
               <a:ext uri="{FF2B5EF4-FFF2-40B4-BE49-F238E27FC236}">
-                <a16:creationId xmlns:a16="http://schemas.microsoft.com/office/drawing/2014/main" id="{82FEDFBC-9C89-4AC9-884D-AB1846B96870}"/>
+                <a16:creationId xmlns:a16="http://schemas.microsoft.com/office/drawing/2014/main" xmlns="" id="{82FEDFBC-9C89-4AC9-884D-AB1846B96870}"/>
               </a:ext>
             </a:extLst>
           </p:cNvPr>
@@ -31581,7 +31589,7 @@
           <p:cNvPr id="29" name="Picture 28" descr="A close up of a light&#10;&#10;Description generated with high confidence">
             <a:extLst>
               <a:ext uri="{FF2B5EF4-FFF2-40B4-BE49-F238E27FC236}">
-                <a16:creationId xmlns:a16="http://schemas.microsoft.com/office/drawing/2014/main" id="{0AB5D88D-0260-47E5-8CAC-628A05C8E15A}"/>
+                <a16:creationId xmlns:a16="http://schemas.microsoft.com/office/drawing/2014/main" xmlns="" id="{0AB5D88D-0260-47E5-8CAC-628A05C8E15A}"/>
               </a:ext>
             </a:extLst>
           </p:cNvPr>
@@ -31617,7 +31625,7 @@
           <p:cNvPr id="30" name="Title 1">
             <a:extLst>
               <a:ext uri="{FF2B5EF4-FFF2-40B4-BE49-F238E27FC236}">
-                <a16:creationId xmlns:a16="http://schemas.microsoft.com/office/drawing/2014/main" id="{488B36B3-FAA2-4721-B63C-7C3A8A9A5812}"/>
+                <a16:creationId xmlns:a16="http://schemas.microsoft.com/office/drawing/2014/main" xmlns="" id="{488B36B3-FAA2-4721-B63C-7C3A8A9A5812}"/>
               </a:ext>
             </a:extLst>
           </p:cNvPr>
@@ -32461,7 +32469,7 @@
           <p:cNvPr id="2" name="Title 1">
             <a:extLst>
               <a:ext uri="{FF2B5EF4-FFF2-40B4-BE49-F238E27FC236}">
-                <a16:creationId xmlns:a16="http://schemas.microsoft.com/office/drawing/2014/main" id="{FEBF2821-0822-4ECF-B77E-56916BDB032E}"/>
+                <a16:creationId xmlns:a16="http://schemas.microsoft.com/office/drawing/2014/main" xmlns="" id="{FEBF2821-0822-4ECF-B77E-56916BDB032E}"/>
               </a:ext>
             </a:extLst>
           </p:cNvPr>
@@ -32489,7 +32497,7 @@
           <p:cNvPr id="4" name="Footer Placeholder 3">
             <a:extLst>
               <a:ext uri="{FF2B5EF4-FFF2-40B4-BE49-F238E27FC236}">
-                <a16:creationId xmlns:a16="http://schemas.microsoft.com/office/drawing/2014/main" id="{70EE12F7-79CE-482C-9E7E-63491BFDB4BC}"/>
+                <a16:creationId xmlns:a16="http://schemas.microsoft.com/office/drawing/2014/main" xmlns="" id="{70EE12F7-79CE-482C-9E7E-63491BFDB4BC}"/>
               </a:ext>
             </a:extLst>
           </p:cNvPr>
@@ -32546,7 +32554,7 @@
           <p:cNvPr id="5" name="Slide Number Placeholder 4">
             <a:extLst>
               <a:ext uri="{FF2B5EF4-FFF2-40B4-BE49-F238E27FC236}">
-                <a16:creationId xmlns:a16="http://schemas.microsoft.com/office/drawing/2014/main" id="{18331794-C61F-44A0-AC04-8D8ADC34F470}"/>
+                <a16:creationId xmlns:a16="http://schemas.microsoft.com/office/drawing/2014/main" xmlns="" id="{18331794-C61F-44A0-AC04-8D8ADC34F470}"/>
               </a:ext>
             </a:extLst>
           </p:cNvPr>
@@ -32576,7 +32584,7 @@
           <p:cNvPr id="6" name="Picture 2" descr="https://www.almacgroup.com/wp-content/uploads/2017/05/image-two.png">
             <a:extLst>
               <a:ext uri="{FF2B5EF4-FFF2-40B4-BE49-F238E27FC236}">
-                <a16:creationId xmlns:a16="http://schemas.microsoft.com/office/drawing/2014/main" id="{6E7CA511-765D-4103-ADD7-1385985A8565}"/>
+                <a16:creationId xmlns:a16="http://schemas.microsoft.com/office/drawing/2014/main" xmlns="" id="{6E7CA511-765D-4103-ADD7-1385985A8565}"/>
               </a:ext>
             </a:extLst>
           </p:cNvPr>
@@ -32621,7 +32629,7 @@
           <p:cNvPr id="7" name="Rectangle 6">
             <a:extLst>
               <a:ext uri="{FF2B5EF4-FFF2-40B4-BE49-F238E27FC236}">
-                <a16:creationId xmlns:a16="http://schemas.microsoft.com/office/drawing/2014/main" id="{23621E01-E00C-4679-985A-31E52DDDBDDF}"/>
+                <a16:creationId xmlns:a16="http://schemas.microsoft.com/office/drawing/2014/main" xmlns="" id="{23621E01-E00C-4679-985A-31E52DDDBDDF}"/>
               </a:ext>
             </a:extLst>
           </p:cNvPr>
@@ -32673,7 +32681,7 @@
           <p:cNvPr id="8" name="Rectangle 7">
             <a:extLst>
               <a:ext uri="{FF2B5EF4-FFF2-40B4-BE49-F238E27FC236}">
-                <a16:creationId xmlns:a16="http://schemas.microsoft.com/office/drawing/2014/main" id="{9A047084-96F2-445A-9EE3-02FACD58E6D8}"/>
+                <a16:creationId xmlns:a16="http://schemas.microsoft.com/office/drawing/2014/main" xmlns="" id="{9A047084-96F2-445A-9EE3-02FACD58E6D8}"/>
               </a:ext>
             </a:extLst>
           </p:cNvPr>
@@ -32841,7 +32849,7 @@
           <p:cNvPr id="2" name="Title 1">
             <a:extLst>
               <a:ext uri="{FF2B5EF4-FFF2-40B4-BE49-F238E27FC236}">
-                <a16:creationId xmlns:a16="http://schemas.microsoft.com/office/drawing/2014/main" id="{2402DCD2-0C35-4CD9-9D55-3AD27C4E6E1A}"/>
+                <a16:creationId xmlns:a16="http://schemas.microsoft.com/office/drawing/2014/main" xmlns="" id="{2402DCD2-0C35-4CD9-9D55-3AD27C4E6E1A}"/>
               </a:ext>
             </a:extLst>
           </p:cNvPr>
@@ -32869,7 +32877,7 @@
           <p:cNvPr id="4" name="Footer Placeholder 3">
             <a:extLst>
               <a:ext uri="{FF2B5EF4-FFF2-40B4-BE49-F238E27FC236}">
-                <a16:creationId xmlns:a16="http://schemas.microsoft.com/office/drawing/2014/main" id="{ED5DDAB4-5465-4C02-B012-5C2392656E96}"/>
+                <a16:creationId xmlns:a16="http://schemas.microsoft.com/office/drawing/2014/main" xmlns="" id="{ED5DDAB4-5465-4C02-B012-5C2392656E96}"/>
               </a:ext>
             </a:extLst>
           </p:cNvPr>
@@ -32926,7 +32934,7 @@
           <p:cNvPr id="5" name="Slide Number Placeholder 4">
             <a:extLst>
               <a:ext uri="{FF2B5EF4-FFF2-40B4-BE49-F238E27FC236}">
-                <a16:creationId xmlns:a16="http://schemas.microsoft.com/office/drawing/2014/main" id="{CECCB517-DD7E-441C-B5C0-DA6D32B76F01}"/>
+                <a16:creationId xmlns:a16="http://schemas.microsoft.com/office/drawing/2014/main" xmlns="" id="{CECCB517-DD7E-441C-B5C0-DA6D32B76F01}"/>
               </a:ext>
             </a:extLst>
           </p:cNvPr>
@@ -32956,7 +32964,7 @@
           <p:cNvPr id="1026" name="Picture 2" descr="Image result for variable selection">
             <a:extLst>
               <a:ext uri="{FF2B5EF4-FFF2-40B4-BE49-F238E27FC236}">
-                <a16:creationId xmlns:a16="http://schemas.microsoft.com/office/drawing/2014/main" id="{4FE87B62-E8A2-4781-8542-17DA5F458E8D}"/>
+                <a16:creationId xmlns:a16="http://schemas.microsoft.com/office/drawing/2014/main" xmlns="" id="{4FE87B62-E8A2-4781-8542-17DA5F458E8D}"/>
               </a:ext>
             </a:extLst>
           </p:cNvPr>
@@ -33003,7 +33011,7 @@
           <p:cNvPr id="1028" name="Picture 4" descr="Image result for lasso">
             <a:extLst>
               <a:ext uri="{FF2B5EF4-FFF2-40B4-BE49-F238E27FC236}">
-                <a16:creationId xmlns:a16="http://schemas.microsoft.com/office/drawing/2014/main" id="{FC74E8AF-26B6-489F-9DAA-748E12CFDBFC}"/>
+                <a16:creationId xmlns:a16="http://schemas.microsoft.com/office/drawing/2014/main" xmlns="" id="{FC74E8AF-26B6-489F-9DAA-748E12CFDBFC}"/>
               </a:ext>
             </a:extLst>
           </p:cNvPr>
@@ -33050,7 +33058,7 @@
           <p:cNvPr id="6" name="TextBox 5">
             <a:extLst>
               <a:ext uri="{FF2B5EF4-FFF2-40B4-BE49-F238E27FC236}">
-                <a16:creationId xmlns:a16="http://schemas.microsoft.com/office/drawing/2014/main" id="{C14B3A59-74C7-4D01-AFC3-2CF85B50385C}"/>
+                <a16:creationId xmlns:a16="http://schemas.microsoft.com/office/drawing/2014/main" xmlns="" id="{C14B3A59-74C7-4D01-AFC3-2CF85B50385C}"/>
               </a:ext>
             </a:extLst>
           </p:cNvPr>
@@ -33361,7 +33369,7 @@
           <p:cNvPr id="2" name="Title 1">
             <a:extLst>
               <a:ext uri="{FF2B5EF4-FFF2-40B4-BE49-F238E27FC236}">
-                <a16:creationId xmlns:a16="http://schemas.microsoft.com/office/drawing/2014/main" id="{6D33CD07-ACD3-477C-A5E6-452B122FF8EB}"/>
+                <a16:creationId xmlns:a16="http://schemas.microsoft.com/office/drawing/2014/main" xmlns="" id="{6D33CD07-ACD3-477C-A5E6-452B122FF8EB}"/>
               </a:ext>
             </a:extLst>
           </p:cNvPr>
@@ -33389,7 +33397,7 @@
           <p:cNvPr id="4" name="Footer Placeholder 3">
             <a:extLst>
               <a:ext uri="{FF2B5EF4-FFF2-40B4-BE49-F238E27FC236}">
-                <a16:creationId xmlns:a16="http://schemas.microsoft.com/office/drawing/2014/main" id="{7E62D83B-F16B-463F-B120-60AA6E0B32BF}"/>
+                <a16:creationId xmlns:a16="http://schemas.microsoft.com/office/drawing/2014/main" xmlns="" id="{7E62D83B-F16B-463F-B120-60AA6E0B32BF}"/>
               </a:ext>
             </a:extLst>
           </p:cNvPr>
@@ -33446,7 +33454,7 @@
           <p:cNvPr id="5" name="Slide Number Placeholder 4">
             <a:extLst>
               <a:ext uri="{FF2B5EF4-FFF2-40B4-BE49-F238E27FC236}">
-                <a16:creationId xmlns:a16="http://schemas.microsoft.com/office/drawing/2014/main" id="{6144BC6C-FC32-4CD0-AD45-9F87F70D3CC2}"/>
+                <a16:creationId xmlns:a16="http://schemas.microsoft.com/office/drawing/2014/main" xmlns="" id="{6144BC6C-FC32-4CD0-AD45-9F87F70D3CC2}"/>
               </a:ext>
             </a:extLst>
           </p:cNvPr>
@@ -33476,7 +33484,7 @@
           <p:cNvPr id="8" name="Picture 2" descr="Image result for lasso algorithm">
             <a:extLst>
               <a:ext uri="{FF2B5EF4-FFF2-40B4-BE49-F238E27FC236}">
-                <a16:creationId xmlns:a16="http://schemas.microsoft.com/office/drawing/2014/main" id="{B7102A31-B859-49A4-A3C6-D4FDBD47EDCF}"/>
+                <a16:creationId xmlns:a16="http://schemas.microsoft.com/office/drawing/2014/main" xmlns="" id="{B7102A31-B859-49A4-A3C6-D4FDBD47EDCF}"/>
               </a:ext>
             </a:extLst>
           </p:cNvPr>
@@ -33521,7 +33529,7 @@
           <p:cNvPr id="7" name="Arrow: Up-Down 6">
             <a:extLst>
               <a:ext uri="{FF2B5EF4-FFF2-40B4-BE49-F238E27FC236}">
-                <a16:creationId xmlns:a16="http://schemas.microsoft.com/office/drawing/2014/main" id="{FD113EF2-491B-4609-8921-03FCAB08BF1E}"/>
+                <a16:creationId xmlns:a16="http://schemas.microsoft.com/office/drawing/2014/main" xmlns="" id="{FD113EF2-491B-4609-8921-03FCAB08BF1E}"/>
               </a:ext>
             </a:extLst>
           </p:cNvPr>
@@ -33567,7 +33575,7 @@
           <p:cNvPr id="9" name="Callout: Bent Line 8">
             <a:extLst>
               <a:ext uri="{FF2B5EF4-FFF2-40B4-BE49-F238E27FC236}">
-                <a16:creationId xmlns:a16="http://schemas.microsoft.com/office/drawing/2014/main" id="{77F1B6FA-577C-4BA6-B36B-E67253C71A96}"/>
+                <a16:creationId xmlns:a16="http://schemas.microsoft.com/office/drawing/2014/main" xmlns="" id="{77F1B6FA-577C-4BA6-B36B-E67253C71A96}"/>
               </a:ext>
             </a:extLst>
           </p:cNvPr>
@@ -33621,7 +33629,7 @@
           <p:cNvPr id="10" name="TextBox 9">
             <a:extLst>
               <a:ext uri="{FF2B5EF4-FFF2-40B4-BE49-F238E27FC236}">
-                <a16:creationId xmlns:a16="http://schemas.microsoft.com/office/drawing/2014/main" id="{45DC9FD1-1820-4C6F-B16B-91B83527087D}"/>
+                <a16:creationId xmlns:a16="http://schemas.microsoft.com/office/drawing/2014/main" xmlns="" id="{45DC9FD1-1820-4C6F-B16B-91B83527087D}"/>
               </a:ext>
             </a:extLst>
           </p:cNvPr>
@@ -33656,7 +33664,7 @@
           <p:cNvPr id="11" name="Rectangle 10">
             <a:extLst>
               <a:ext uri="{FF2B5EF4-FFF2-40B4-BE49-F238E27FC236}">
-                <a16:creationId xmlns:a16="http://schemas.microsoft.com/office/drawing/2014/main" id="{2892C7A8-5EB9-445F-A43B-5FD12C3D0885}"/>
+                <a16:creationId xmlns:a16="http://schemas.microsoft.com/office/drawing/2014/main" xmlns="" id="{2892C7A8-5EB9-445F-A43B-5FD12C3D0885}"/>
               </a:ext>
             </a:extLst>
           </p:cNvPr>
@@ -33705,7 +33713,7 @@
               <p:cNvPr id="6" name="Content Placeholder 5">
                 <a:extLst>
                   <a:ext uri="{FF2B5EF4-FFF2-40B4-BE49-F238E27FC236}">
-                    <a16:creationId xmlns:a16="http://schemas.microsoft.com/office/drawing/2014/main" id="{8EE6EF1C-7BAD-43FC-8EDB-996441C677D3}"/>
+                    <a16:creationId xmlns:a16="http://schemas.microsoft.com/office/drawing/2014/main" xmlns="" id="{8EE6EF1C-7BAD-43FC-8EDB-996441C677D3}"/>
                   </a:ext>
                 </a:extLst>
               </p:cNvPr>
@@ -33741,7 +33749,7 @@
                         <m:limLowPr>
                           <m:ctrlPr>
                             <a:rPr lang="en-US" sz="2800" b="0" i="1" smtClean="0">
-                              <a:latin typeface="Cambria Math" panose="02040503050406030204" pitchFamily="18" charset="0"/>
+                              <a:latin typeface="Cambria Math" charset="0"/>
                             </a:rPr>
                           </m:ctrlPr>
                         </m:limLowPr>
@@ -33799,7 +33807,7 @@
                         <m:sSubSupPr>
                           <m:ctrlPr>
                             <a:rPr lang="en-US" sz="2800" b="0" i="1" smtClean="0">
-                              <a:latin typeface="Cambria Math" panose="02040503050406030204" pitchFamily="18" charset="0"/>
+                              <a:latin typeface="Cambria Math" charset="0"/>
                             </a:rPr>
                           </m:ctrlPr>
                         </m:sSubSupPr>
@@ -33874,7 +33882,7 @@
                         <m:sSubPr>
                           <m:ctrlPr>
                             <a:rPr lang="en-US" sz="2800" b="0" i="1" smtClean="0">
-                              <a:latin typeface="Cambria Math" panose="02040503050406030204" pitchFamily="18" charset="0"/>
+                              <a:latin typeface="Cambria Math" charset="0"/>
                             </a:rPr>
                           </m:ctrlPr>
                         </m:sSubPr>
@@ -33885,7 +33893,7 @@
                               <m:endChr m:val="|"/>
                               <m:ctrlPr>
                                 <a:rPr lang="en-US" sz="2800" b="0" i="1" smtClean="0">
-                                  <a:latin typeface="Cambria Math" panose="02040503050406030204" pitchFamily="18" charset="0"/>
+                                  <a:latin typeface="Cambria Math" charset="0"/>
                                 </a:rPr>
                               </m:ctrlPr>
                             </m:dPr>
@@ -33951,7 +33959,7 @@
                         <m:limLowPr>
                           <m:ctrlPr>
                             <a:rPr lang="en-US" sz="2800" b="0" i="1" smtClean="0">
-                              <a:latin typeface="Cambria Math" panose="02040503050406030204" pitchFamily="18" charset="0"/>
+                              <a:latin typeface="Cambria Math" charset="0"/>
                             </a:rPr>
                           </m:ctrlPr>
                         </m:limLowPr>
@@ -34009,7 +34017,7 @@
                         <m:sSubSupPr>
                           <m:ctrlPr>
                             <a:rPr lang="en-US" sz="2800" b="0" i="1" smtClean="0">
-                              <a:latin typeface="Cambria Math" panose="02040503050406030204" pitchFamily="18" charset="0"/>
+                              <a:latin typeface="Cambria Math" charset="0"/>
                             </a:rPr>
                           </m:ctrlPr>
                         </m:sSubSupPr>
@@ -34604,7 +34612,7 @@
           <p:cNvPr id="2" name="Title 1">
             <a:extLst>
               <a:ext uri="{FF2B5EF4-FFF2-40B4-BE49-F238E27FC236}">
-                <a16:creationId xmlns:a16="http://schemas.microsoft.com/office/drawing/2014/main" id="{17A8BB3D-2D35-4F66-AFB4-2A9AE7681862}"/>
+                <a16:creationId xmlns:a16="http://schemas.microsoft.com/office/drawing/2014/main" xmlns="" id="{17A8BB3D-2D35-4F66-AFB4-2A9AE7681862}"/>
               </a:ext>
             </a:extLst>
           </p:cNvPr>
@@ -34638,7 +34646,7 @@
           <p:cNvPr id="3" name="Footer Placeholder 2">
             <a:extLst>
               <a:ext uri="{FF2B5EF4-FFF2-40B4-BE49-F238E27FC236}">
-                <a16:creationId xmlns:a16="http://schemas.microsoft.com/office/drawing/2014/main" id="{11862E8A-91FD-4C41-A192-DB3D27D88824}"/>
+                <a16:creationId xmlns:a16="http://schemas.microsoft.com/office/drawing/2014/main" xmlns="" id="{11862E8A-91FD-4C41-A192-DB3D27D88824}"/>
               </a:ext>
             </a:extLst>
           </p:cNvPr>
@@ -34695,7 +34703,7 @@
           <p:cNvPr id="4" name="Slide Number Placeholder 3">
             <a:extLst>
               <a:ext uri="{FF2B5EF4-FFF2-40B4-BE49-F238E27FC236}">
-                <a16:creationId xmlns:a16="http://schemas.microsoft.com/office/drawing/2014/main" id="{9DA5ED20-07EE-4130-97A2-FC2FBDDF57B9}"/>
+                <a16:creationId xmlns:a16="http://schemas.microsoft.com/office/drawing/2014/main" xmlns="" id="{9DA5ED20-07EE-4130-97A2-FC2FBDDF57B9}"/>
               </a:ext>
             </a:extLst>
           </p:cNvPr>

</xml_diff>